<commit_message>
Wrote presentation final 1
</commit_message>
<xml_diff>
--- a/Documents/Presentation_final_1.pptx
+++ b/Documents/Presentation_final_1.pptx
@@ -6,12 +6,23 @@
     <p:sldMasterId id="2147483711" r:id="rId2"/>
   </p:sldMasterIdLst>
   <p:notesMasterIdLst>
-    <p:notesMasterId r:id="rId6"/>
+    <p:notesMasterId r:id="rId17"/>
   </p:notesMasterIdLst>
   <p:sldIdLst>
     <p:sldId id="256" r:id="rId3"/>
     <p:sldId id="288" r:id="rId4"/>
-    <p:sldId id="287" r:id="rId5"/>
+    <p:sldId id="289" r:id="rId5"/>
+    <p:sldId id="290" r:id="rId6"/>
+    <p:sldId id="291" r:id="rId7"/>
+    <p:sldId id="292" r:id="rId8"/>
+    <p:sldId id="293" r:id="rId9"/>
+    <p:sldId id="294" r:id="rId10"/>
+    <p:sldId id="295" r:id="rId11"/>
+    <p:sldId id="296" r:id="rId12"/>
+    <p:sldId id="297" r:id="rId13"/>
+    <p:sldId id="298" r:id="rId14"/>
+    <p:sldId id="299" r:id="rId15"/>
+    <p:sldId id="287" r:id="rId16"/>
   </p:sldIdLst>
   <p:sldSz cx="12192000" cy="6858000"/>
   <p:notesSz cx="6858000" cy="9144000"/>
@@ -543,6 +554,90 @@
     <p:extLst>
       <p:ext uri="{BB962C8B-B14F-4D97-AF65-F5344CB8AC3E}">
         <p14:creationId xmlns:p14="http://schemas.microsoft.com/office/powerpoint/2010/main" val="4172472360"/>
+      </p:ext>
+    </p:extLst>
+  </p:cSld>
+  <p:clrMapOvr>
+    <a:masterClrMapping/>
+  </p:clrMapOvr>
+</p:notes>
+</file>
+
+<file path=ppt/notesSlides/notesSlide2.xml><?xml version="1.0" encoding="utf-8"?>
+<p:notes xmlns:a="http://schemas.openxmlformats.org/drawingml/2006/main" xmlns:r="http://schemas.openxmlformats.org/officeDocument/2006/relationships" xmlns:p="http://schemas.openxmlformats.org/presentationml/2006/main">
+  <p:cSld>
+    <p:spTree>
+      <p:nvGrpSpPr>
+        <p:cNvPr id="1" name=""/>
+        <p:cNvGrpSpPr/>
+        <p:nvPr/>
+      </p:nvGrpSpPr>
+      <p:grpSpPr>
+        <a:xfrm>
+          <a:off x="0" y="0"/>
+          <a:ext cx="0" cy="0"/>
+          <a:chOff x="0" y="0"/>
+          <a:chExt cx="0" cy="0"/>
+        </a:xfrm>
+      </p:grpSpPr>
+      <p:sp>
+        <p:nvSpPr>
+          <p:cNvPr id="2" name="Espace réservé de l'image des diapositives 1"/>
+          <p:cNvSpPr>
+            <a:spLocks noGrp="1" noRot="1" noChangeAspect="1"/>
+          </p:cNvSpPr>
+          <p:nvPr>
+            <p:ph type="sldImg"/>
+          </p:nvPr>
+        </p:nvSpPr>
+        <p:spPr/>
+      </p:sp>
+      <p:sp>
+        <p:nvSpPr>
+          <p:cNvPr id="3" name="Espace réservé des commentaires 2"/>
+          <p:cNvSpPr>
+            <a:spLocks noGrp="1"/>
+          </p:cNvSpPr>
+          <p:nvPr>
+            <p:ph type="body" idx="1"/>
+          </p:nvPr>
+        </p:nvSpPr>
+        <p:spPr/>
+        <p:txBody>
+          <a:bodyPr/>
+          <a:lstStyle/>
+          <a:p>
+            <a:endParaRPr lang="fr-CH" dirty="0"/>
+          </a:p>
+        </p:txBody>
+      </p:sp>
+      <p:sp>
+        <p:nvSpPr>
+          <p:cNvPr id="4" name="Espace réservé du numéro de diapositive 3"/>
+          <p:cNvSpPr>
+            <a:spLocks noGrp="1"/>
+          </p:cNvSpPr>
+          <p:nvPr>
+            <p:ph type="sldNum" sz="quarter" idx="10"/>
+          </p:nvPr>
+        </p:nvSpPr>
+        <p:spPr/>
+        <p:txBody>
+          <a:bodyPr/>
+          <a:lstStyle/>
+          <a:p>
+            <a:fld id="{5D8B9E25-742F-4AB9-9769-63653C51E899}" type="slidenum">
+              <a:rPr lang="fr-CH" smtClean="0"/>
+              <a:t>13</a:t>
+            </a:fld>
+            <a:endParaRPr lang="fr-CH"/>
+          </a:p>
+        </p:txBody>
+      </p:sp>
+    </p:spTree>
+    <p:extLst>
+      <p:ext uri="{BB962C8B-B14F-4D97-AF65-F5344CB8AC3E}">
+        <p14:creationId xmlns:p14="http://schemas.microsoft.com/office/powerpoint/2010/main" val="2820483643"/>
       </p:ext>
     </p:extLst>
   </p:cSld>
@@ -9645,6 +9740,661 @@
   <p:clrMapOvr>
     <a:masterClrMapping/>
   </p:clrMapOvr>
+  <p:timing>
+    <p:tnLst>
+      <p:par>
+        <p:cTn id="1" dur="indefinite" restart="never" nodeType="tmRoot"/>
+      </p:par>
+    </p:tnLst>
+  </p:timing>
+</p:sld>
+</file>
+
+<file path=ppt/slides/slide10.xml><?xml version="1.0" encoding="utf-8"?>
+<p:sld xmlns:a="http://schemas.openxmlformats.org/drawingml/2006/main" xmlns:r="http://schemas.openxmlformats.org/officeDocument/2006/relationships" xmlns:p="http://schemas.openxmlformats.org/presentationml/2006/main">
+  <p:cSld>
+    <p:spTree>
+      <p:nvGrpSpPr>
+        <p:cNvPr id="1" name=""/>
+        <p:cNvGrpSpPr/>
+        <p:nvPr/>
+      </p:nvGrpSpPr>
+      <p:grpSpPr>
+        <a:xfrm>
+          <a:off x="0" y="0"/>
+          <a:ext cx="0" cy="0"/>
+          <a:chOff x="0" y="0"/>
+          <a:chExt cx="0" cy="0"/>
+        </a:xfrm>
+      </p:grpSpPr>
+      <p:sp>
+        <p:nvSpPr>
+          <p:cNvPr id="2" name="Titre 1"/>
+          <p:cNvSpPr>
+            <a:spLocks noGrp="1"/>
+          </p:cNvSpPr>
+          <p:nvPr>
+            <p:ph type="title"/>
+          </p:nvPr>
+        </p:nvSpPr>
+        <p:spPr/>
+        <p:txBody>
+          <a:bodyPr/>
+          <a:lstStyle/>
+          <a:p>
+            <a:r>
+              <a:rPr lang="fr-CH" dirty="0"/>
+              <a:t>Mode d’évaluation prévu</a:t>
+            </a:r>
+          </a:p>
+        </p:txBody>
+      </p:sp>
+      <p:sp>
+        <p:nvSpPr>
+          <p:cNvPr id="4" name="Espace réservé du numéro de diapositive 3"/>
+          <p:cNvSpPr>
+            <a:spLocks noGrp="1"/>
+          </p:cNvSpPr>
+          <p:nvPr>
+            <p:ph type="sldNum" sz="quarter" idx="12"/>
+          </p:nvPr>
+        </p:nvSpPr>
+        <p:spPr/>
+        <p:txBody>
+          <a:bodyPr/>
+          <a:lstStyle/>
+          <a:p>
+            <a:fld id="{F60449C3-8BCD-4455-8E2A-A866209B9601}" type="slidenum">
+              <a:rPr lang="fr-CH" smtClean="0"/>
+              <a:t>10</a:t>
+            </a:fld>
+            <a:endParaRPr lang="fr-CH"/>
+          </a:p>
+        </p:txBody>
+      </p:sp>
+      <p:sp>
+        <p:nvSpPr>
+          <p:cNvPr id="5" name="ZoneTexte 4"/>
+          <p:cNvSpPr txBox="1"/>
+          <p:nvPr/>
+        </p:nvSpPr>
+        <p:spPr>
+          <a:xfrm>
+            <a:off x="743237" y="2799654"/>
+            <a:ext cx="5001369" cy="523220"/>
+          </a:xfrm>
+          <a:prstGeom prst="rect">
+            <a:avLst/>
+          </a:prstGeom>
+          <a:noFill/>
+        </p:spPr>
+        <p:txBody>
+          <a:bodyPr wrap="none" rtlCol="0">
+            <a:spAutoFit/>
+          </a:bodyPr>
+          <a:lstStyle/>
+          <a:p>
+            <a:r>
+              <a:rPr lang="fr-CH" sz="2800" dirty="0" smtClean="0"/>
+              <a:t>Questionnaire post-expérimental</a:t>
+            </a:r>
+            <a:endParaRPr lang="fr-CH" sz="2800" dirty="0"/>
+          </a:p>
+        </p:txBody>
+      </p:sp>
+      <p:sp>
+        <p:nvSpPr>
+          <p:cNvPr id="6" name="Espace réservé du contenu 2"/>
+          <p:cNvSpPr>
+            <a:spLocks noGrp="1"/>
+          </p:cNvSpPr>
+          <p:nvPr>
+            <p:ph idx="1"/>
+          </p:nvPr>
+        </p:nvSpPr>
+        <p:spPr>
+          <a:xfrm>
+            <a:off x="743236" y="3710223"/>
+            <a:ext cx="6852050" cy="1323096"/>
+          </a:xfrm>
+        </p:spPr>
+        <p:txBody>
+          <a:bodyPr>
+            <a:normAutofit/>
+          </a:bodyPr>
+          <a:lstStyle/>
+          <a:p>
+            <a:endParaRPr lang="fr-CH" sz="1600" dirty="0"/>
+          </a:p>
+        </p:txBody>
+      </p:sp>
+    </p:spTree>
+    <p:extLst>
+      <p:ext uri="{BB962C8B-B14F-4D97-AF65-F5344CB8AC3E}">
+        <p14:creationId xmlns:p14="http://schemas.microsoft.com/office/powerpoint/2010/main" val="1361261247"/>
+      </p:ext>
+    </p:extLst>
+  </p:cSld>
+  <p:clrMapOvr>
+    <a:masterClrMapping/>
+  </p:clrMapOvr>
+  <p:timing>
+    <p:tnLst>
+      <p:par>
+        <p:cTn id="1" dur="indefinite" restart="never" nodeType="tmRoot"/>
+      </p:par>
+    </p:tnLst>
+  </p:timing>
+</p:sld>
+</file>
+
+<file path=ppt/slides/slide11.xml><?xml version="1.0" encoding="utf-8"?>
+<p:sld xmlns:a="http://schemas.openxmlformats.org/drawingml/2006/main" xmlns:r="http://schemas.openxmlformats.org/officeDocument/2006/relationships" xmlns:p="http://schemas.openxmlformats.org/presentationml/2006/main" show="0">
+  <p:cSld>
+    <p:spTree>
+      <p:nvGrpSpPr>
+        <p:cNvPr id="1" name=""/>
+        <p:cNvGrpSpPr/>
+        <p:nvPr/>
+      </p:nvGrpSpPr>
+      <p:grpSpPr>
+        <a:xfrm>
+          <a:off x="0" y="0"/>
+          <a:ext cx="0" cy="0"/>
+          <a:chOff x="0" y="0"/>
+          <a:chExt cx="0" cy="0"/>
+        </a:xfrm>
+      </p:grpSpPr>
+      <p:sp>
+        <p:nvSpPr>
+          <p:cNvPr id="2" name="Titre 1"/>
+          <p:cNvSpPr>
+            <a:spLocks noGrp="1"/>
+          </p:cNvSpPr>
+          <p:nvPr>
+            <p:ph type="title"/>
+          </p:nvPr>
+        </p:nvSpPr>
+        <p:spPr/>
+        <p:txBody>
+          <a:bodyPr/>
+          <a:lstStyle/>
+          <a:p>
+            <a:r>
+              <a:rPr lang="fr-FR" dirty="0"/>
+              <a:t>Questionnaire post-expérimental (détail</a:t>
+            </a:r>
+            <a:r>
+              <a:rPr lang="fr-FR" dirty="0" smtClean="0"/>
+              <a:t>)</a:t>
+            </a:r>
+            <a:endParaRPr lang="fr-FR" dirty="0"/>
+          </a:p>
+        </p:txBody>
+      </p:sp>
+      <p:sp>
+        <p:nvSpPr>
+          <p:cNvPr id="3" name="Espace réservé du contenu 2"/>
+          <p:cNvSpPr>
+            <a:spLocks noGrp="1"/>
+          </p:cNvSpPr>
+          <p:nvPr>
+            <p:ph idx="1"/>
+          </p:nvPr>
+        </p:nvSpPr>
+        <p:spPr/>
+        <p:txBody>
+          <a:bodyPr>
+            <a:normAutofit fontScale="85000" lnSpcReduction="10000"/>
+          </a:bodyPr>
+          <a:lstStyle/>
+          <a:p>
+            <a:r>
+              <a:rPr lang="fr-FR" dirty="0" smtClean="0"/>
+              <a:t>«</a:t>
+            </a:r>
+            <a:r>
+              <a:rPr lang="fr-FR" dirty="0"/>
+              <a:t>Lorsque je n'avais presque plus de vie, je me suis sentie plus stressé que le reste du temps» </a:t>
+            </a:r>
+          </a:p>
+          <a:p>
+            <a:r>
+              <a:rPr lang="fr-FR" dirty="0"/>
+              <a:t>«Il est plus stressant de jouer avec hexagones que sans hexagones»</a:t>
+            </a:r>
+          </a:p>
+          <a:p>
+            <a:r>
+              <a:rPr lang="fr-FR" dirty="0"/>
+              <a:t>«Il est plus stressant de jouer avec indicateurs que sans indicateurs»</a:t>
+            </a:r>
+          </a:p>
+          <a:p>
+            <a:r>
+              <a:rPr lang="fr-FR" dirty="0"/>
+              <a:t>«J'ai préféré jouer avec les hexagones que sans»</a:t>
+            </a:r>
+          </a:p>
+          <a:p>
+            <a:r>
+              <a:rPr lang="fr-FR" dirty="0"/>
+              <a:t>«J'ai préféré jouer avec les indicateurs que sans»</a:t>
+            </a:r>
+          </a:p>
+          <a:p>
+            <a:r>
+              <a:rPr lang="fr-FR" dirty="0"/>
+              <a:t>«J'ai remarqué que la musique qui change de rythme donnait une indication sur la partie»</a:t>
+            </a:r>
+          </a:p>
+          <a:p>
+            <a:r>
+              <a:rPr lang="fr-FR" dirty="0"/>
+              <a:t>«J'ai remarqué que le fond d'écran qui changent de couleur donnait une indication sur la partie»</a:t>
+            </a:r>
+          </a:p>
+          <a:p>
+            <a:r>
+              <a:rPr lang="fr-FR" dirty="0"/>
+              <a:t>Noter de 1 à 5 le niveau de stresse expérimenté durant chacune des 4 tâches</a:t>
+            </a:r>
+            <a:endParaRPr lang="fr-CH" dirty="0"/>
+          </a:p>
+        </p:txBody>
+      </p:sp>
+      <p:sp>
+        <p:nvSpPr>
+          <p:cNvPr id="4" name="Espace réservé du numéro de diapositive 3"/>
+          <p:cNvSpPr>
+            <a:spLocks noGrp="1"/>
+          </p:cNvSpPr>
+          <p:nvPr>
+            <p:ph type="sldNum" sz="quarter" idx="12"/>
+          </p:nvPr>
+        </p:nvSpPr>
+        <p:spPr/>
+        <p:txBody>
+          <a:bodyPr/>
+          <a:lstStyle/>
+          <a:p>
+            <a:fld id="{F60449C3-8BCD-4455-8E2A-A866209B9601}" type="slidenum">
+              <a:rPr lang="fr-CH" smtClean="0"/>
+              <a:t>11</a:t>
+            </a:fld>
+            <a:endParaRPr lang="fr-CH"/>
+          </a:p>
+        </p:txBody>
+      </p:sp>
+    </p:spTree>
+    <p:extLst>
+      <p:ext uri="{BB962C8B-B14F-4D97-AF65-F5344CB8AC3E}">
+        <p14:creationId xmlns:p14="http://schemas.microsoft.com/office/powerpoint/2010/main" val="4225904007"/>
+      </p:ext>
+    </p:extLst>
+  </p:cSld>
+  <p:clrMapOvr>
+    <a:masterClrMapping/>
+  </p:clrMapOvr>
+  <mc:AlternateContent xmlns:mc="http://schemas.openxmlformats.org/markup-compatibility/2006">
+    <mc:Choice xmlns:p14="http://schemas.microsoft.com/office/powerpoint/2010/main" Requires="p14">
+      <p:transition spd="slow" p14:dur="2000"/>
+    </mc:Choice>
+    <mc:Fallback>
+      <p:transition spd="slow"/>
+    </mc:Fallback>
+  </mc:AlternateContent>
+  <p:timing>
+    <p:tnLst>
+      <p:par>
+        <p:cTn id="1" dur="indefinite" restart="never" nodeType="tmRoot"/>
+      </p:par>
+    </p:tnLst>
+  </p:timing>
+</p:sld>
+</file>
+
+<file path=ppt/slides/slide12.xml><?xml version="1.0" encoding="utf-8"?>
+<p:sld xmlns:a="http://schemas.openxmlformats.org/drawingml/2006/main" xmlns:r="http://schemas.openxmlformats.org/officeDocument/2006/relationships" xmlns:p="http://schemas.openxmlformats.org/presentationml/2006/main">
+  <p:cSld>
+    <p:spTree>
+      <p:nvGrpSpPr>
+        <p:cNvPr id="1" name=""/>
+        <p:cNvGrpSpPr/>
+        <p:nvPr/>
+      </p:nvGrpSpPr>
+      <p:grpSpPr>
+        <a:xfrm>
+          <a:off x="0" y="0"/>
+          <a:ext cx="0" cy="0"/>
+          <a:chOff x="0" y="0"/>
+          <a:chExt cx="0" cy="0"/>
+        </a:xfrm>
+      </p:grpSpPr>
+      <p:sp>
+        <p:nvSpPr>
+          <p:cNvPr id="2" name="Titre 1"/>
+          <p:cNvSpPr>
+            <a:spLocks noGrp="1"/>
+          </p:cNvSpPr>
+          <p:nvPr>
+            <p:ph type="title"/>
+          </p:nvPr>
+        </p:nvSpPr>
+        <p:spPr/>
+        <p:txBody>
+          <a:bodyPr/>
+          <a:lstStyle/>
+          <a:p>
+            <a:r>
+              <a:rPr lang="fr-CH" dirty="0" smtClean="0"/>
+              <a:t>Conclusion</a:t>
+            </a:r>
+            <a:endParaRPr lang="fr-CH" dirty="0"/>
+          </a:p>
+        </p:txBody>
+      </p:sp>
+      <p:sp>
+        <p:nvSpPr>
+          <p:cNvPr id="3" name="Espace réservé du contenu 2"/>
+          <p:cNvSpPr>
+            <a:spLocks noGrp="1"/>
+          </p:cNvSpPr>
+          <p:nvPr>
+            <p:ph idx="1"/>
+          </p:nvPr>
+        </p:nvSpPr>
+        <p:spPr/>
+        <p:txBody>
+          <a:bodyPr/>
+          <a:lstStyle/>
+          <a:p>
+            <a:endParaRPr lang="fr-CH" dirty="0"/>
+          </a:p>
+        </p:txBody>
+      </p:sp>
+      <p:sp>
+        <p:nvSpPr>
+          <p:cNvPr id="4" name="Espace réservé du numéro de diapositive 3"/>
+          <p:cNvSpPr>
+            <a:spLocks noGrp="1"/>
+          </p:cNvSpPr>
+          <p:nvPr>
+            <p:ph type="sldNum" sz="quarter" idx="12"/>
+          </p:nvPr>
+        </p:nvSpPr>
+        <p:spPr/>
+        <p:txBody>
+          <a:bodyPr/>
+          <a:lstStyle/>
+          <a:p>
+            <a:fld id="{F60449C3-8BCD-4455-8E2A-A866209B9601}" type="slidenum">
+              <a:rPr lang="fr-CH" smtClean="0"/>
+              <a:t>12</a:t>
+            </a:fld>
+            <a:endParaRPr lang="fr-CH"/>
+          </a:p>
+        </p:txBody>
+      </p:sp>
+    </p:spTree>
+    <p:extLst>
+      <p:ext uri="{BB962C8B-B14F-4D97-AF65-F5344CB8AC3E}">
+        <p14:creationId xmlns:p14="http://schemas.microsoft.com/office/powerpoint/2010/main" val="1940971933"/>
+      </p:ext>
+    </p:extLst>
+  </p:cSld>
+  <p:clrMapOvr>
+    <a:masterClrMapping/>
+  </p:clrMapOvr>
+  <p:timing>
+    <p:tnLst>
+      <p:par>
+        <p:cTn id="1" dur="indefinite" restart="never" nodeType="tmRoot"/>
+      </p:par>
+    </p:tnLst>
+  </p:timing>
+</p:sld>
+</file>
+
+<file path=ppt/slides/slide13.xml><?xml version="1.0" encoding="utf-8"?>
+<p:sld xmlns:a="http://schemas.openxmlformats.org/drawingml/2006/main" xmlns:r="http://schemas.openxmlformats.org/officeDocument/2006/relationships" xmlns:p="http://schemas.openxmlformats.org/presentationml/2006/main">
+  <p:cSld>
+    <p:spTree>
+      <p:nvGrpSpPr>
+        <p:cNvPr id="1" name=""/>
+        <p:cNvGrpSpPr/>
+        <p:nvPr/>
+      </p:nvGrpSpPr>
+      <p:grpSpPr>
+        <a:xfrm>
+          <a:off x="0" y="0"/>
+          <a:ext cx="0" cy="0"/>
+          <a:chOff x="0" y="0"/>
+          <a:chExt cx="0" cy="0"/>
+        </a:xfrm>
+      </p:grpSpPr>
+      <p:sp>
+        <p:nvSpPr>
+          <p:cNvPr id="2" name="Titre 1"/>
+          <p:cNvSpPr>
+            <a:spLocks noGrp="1"/>
+          </p:cNvSpPr>
+          <p:nvPr>
+            <p:ph type="title"/>
+          </p:nvPr>
+        </p:nvSpPr>
+        <p:spPr/>
+        <p:txBody>
+          <a:bodyPr/>
+          <a:lstStyle/>
+          <a:p>
+            <a:r>
+              <a:rPr lang="fr-CH" dirty="0" smtClean="0"/>
+              <a:t>Répartition des tâches</a:t>
+            </a:r>
+            <a:endParaRPr lang="fr-CH" dirty="0"/>
+          </a:p>
+        </p:txBody>
+      </p:sp>
+      <p:pic>
+        <p:nvPicPr>
+          <p:cNvPr id="5" name="Espace réservé du contenu 4"/>
+          <p:cNvPicPr>
+            <a:picLocks noGrp="1" noChangeAspect="1"/>
+          </p:cNvPicPr>
+          <p:nvPr>
+            <p:ph idx="1"/>
+          </p:nvPr>
+        </p:nvPicPr>
+        <p:blipFill rotWithShape="1">
+          <a:blip r:embed="rId3">
+            <a:extLst>
+              <a:ext uri="{28A0092B-C50C-407E-A947-70E740481C1C}">
+                <a14:useLocalDpi xmlns:a14="http://schemas.microsoft.com/office/drawing/2010/main" val="0"/>
+              </a:ext>
+            </a:extLst>
+          </a:blip>
+          <a:srcRect l="7962" t="4305" r="10446" b="9936"/>
+          <a:stretch/>
+        </p:blipFill>
+        <p:spPr>
+          <a:xfrm>
+            <a:off x="5385965" y="2891170"/>
+            <a:ext cx="1145059" cy="1351169"/>
+          </a:xfrm>
+        </p:spPr>
+      </p:pic>
+      <p:sp>
+        <p:nvSpPr>
+          <p:cNvPr id="4" name="Espace réservé du numéro de diapositive 3"/>
+          <p:cNvSpPr>
+            <a:spLocks noGrp="1"/>
+          </p:cNvSpPr>
+          <p:nvPr>
+            <p:ph type="sldNum" sz="quarter" idx="12"/>
+          </p:nvPr>
+        </p:nvSpPr>
+        <p:spPr/>
+        <p:txBody>
+          <a:bodyPr/>
+          <a:lstStyle/>
+          <a:p>
+            <a:fld id="{F60449C3-8BCD-4455-8E2A-A866209B9601}" type="slidenum">
+              <a:rPr lang="fr-CH" smtClean="0"/>
+              <a:t>13</a:t>
+            </a:fld>
+            <a:endParaRPr lang="fr-CH"/>
+          </a:p>
+        </p:txBody>
+      </p:sp>
+      <p:sp>
+        <p:nvSpPr>
+          <p:cNvPr id="6" name="ZoneTexte 5"/>
+          <p:cNvSpPr txBox="1"/>
+          <p:nvPr/>
+        </p:nvSpPr>
+        <p:spPr>
+          <a:xfrm>
+            <a:off x="5165137" y="4351309"/>
+            <a:ext cx="1586716" cy="461665"/>
+          </a:xfrm>
+          <a:prstGeom prst="rect">
+            <a:avLst/>
+          </a:prstGeom>
+          <a:noFill/>
+        </p:spPr>
+        <p:txBody>
+          <a:bodyPr wrap="none" rtlCol="0">
+            <a:spAutoFit/>
+          </a:bodyPr>
+          <a:lstStyle/>
+          <a:p>
+            <a:r>
+              <a:rPr lang="fr-CH" sz="2400" dirty="0" smtClean="0"/>
+              <a:t>Répartition</a:t>
+            </a:r>
+            <a:endParaRPr lang="fr-CH" sz="2400" dirty="0"/>
+          </a:p>
+        </p:txBody>
+      </p:sp>
+    </p:spTree>
+    <p:extLst>
+      <p:ext uri="{BB962C8B-B14F-4D97-AF65-F5344CB8AC3E}">
+        <p14:creationId xmlns:p14="http://schemas.microsoft.com/office/powerpoint/2010/main" val="188461780"/>
+      </p:ext>
+    </p:extLst>
+  </p:cSld>
+  <p:clrMapOvr>
+    <a:masterClrMapping/>
+  </p:clrMapOvr>
+  <p:timing>
+    <p:tnLst>
+      <p:par>
+        <p:cTn id="1" dur="indefinite" restart="never" nodeType="tmRoot"/>
+      </p:par>
+    </p:tnLst>
+  </p:timing>
+</p:sld>
+</file>
+
+<file path=ppt/slides/slide14.xml><?xml version="1.0" encoding="utf-8"?>
+<p:sld xmlns:a="http://schemas.openxmlformats.org/drawingml/2006/main" xmlns:r="http://schemas.openxmlformats.org/officeDocument/2006/relationships" xmlns:p="http://schemas.openxmlformats.org/presentationml/2006/main">
+  <p:cSld>
+    <p:spTree>
+      <p:nvGrpSpPr>
+        <p:cNvPr id="1" name=""/>
+        <p:cNvGrpSpPr/>
+        <p:nvPr/>
+      </p:nvGrpSpPr>
+      <p:grpSpPr>
+        <a:xfrm>
+          <a:off x="0" y="0"/>
+          <a:ext cx="0" cy="0"/>
+          <a:chOff x="0" y="0"/>
+          <a:chExt cx="0" cy="0"/>
+        </a:xfrm>
+      </p:grpSpPr>
+      <p:sp>
+        <p:nvSpPr>
+          <p:cNvPr id="2" name="Titre 1"/>
+          <p:cNvSpPr>
+            <a:spLocks noGrp="1"/>
+          </p:cNvSpPr>
+          <p:nvPr>
+            <p:ph type="title"/>
+          </p:nvPr>
+        </p:nvSpPr>
+        <p:spPr/>
+        <p:txBody>
+          <a:bodyPr/>
+          <a:lstStyle/>
+          <a:p>
+            <a:r>
+              <a:rPr lang="fr-CH" dirty="0"/>
+              <a:t>Merci pour votre attention</a:t>
+            </a:r>
+          </a:p>
+        </p:txBody>
+      </p:sp>
+      <p:sp>
+        <p:nvSpPr>
+          <p:cNvPr id="3" name="Espace réservé du texte 2"/>
+          <p:cNvSpPr>
+            <a:spLocks noGrp="1"/>
+          </p:cNvSpPr>
+          <p:nvPr>
+            <p:ph type="body" idx="1"/>
+          </p:nvPr>
+        </p:nvSpPr>
+        <p:spPr/>
+        <p:txBody>
+          <a:bodyPr/>
+          <a:lstStyle/>
+          <a:p>
+            <a:endParaRPr lang="fr-CH"/>
+          </a:p>
+        </p:txBody>
+      </p:sp>
+      <p:sp>
+        <p:nvSpPr>
+          <p:cNvPr id="4" name="Espace réservé du numéro de diapositive 3"/>
+          <p:cNvSpPr>
+            <a:spLocks noGrp="1"/>
+          </p:cNvSpPr>
+          <p:nvPr>
+            <p:ph type="sldNum" sz="quarter" idx="12"/>
+          </p:nvPr>
+        </p:nvSpPr>
+        <p:spPr/>
+        <p:txBody>
+          <a:bodyPr/>
+          <a:lstStyle/>
+          <a:p>
+            <a:fld id="{5C659214-C5B2-4878-BE63-6680446A108B}" type="slidenum">
+              <a:rPr lang="fr-CH" smtClean="0"/>
+              <a:t>14</a:t>
+            </a:fld>
+            <a:endParaRPr lang="fr-CH"/>
+          </a:p>
+        </p:txBody>
+      </p:sp>
+    </p:spTree>
+    <p:extLst>
+      <p:ext uri="{BB962C8B-B14F-4D97-AF65-F5344CB8AC3E}">
+        <p14:creationId xmlns:p14="http://schemas.microsoft.com/office/powerpoint/2010/main" val="2003252175"/>
+      </p:ext>
+    </p:extLst>
+  </p:cSld>
+  <p:clrMapOvr>
+    <a:masterClrMapping/>
+  </p:clrMapOvr>
+  <p:timing>
+    <p:tnLst>
+      <p:par>
+        <p:cTn id="1" dur="indefinite" restart="never" nodeType="tmRoot"/>
+      </p:par>
+    </p:tnLst>
+  </p:timing>
 </p:sld>
 </file>
 
@@ -9680,26 +10430,11 @@
           <a:bodyPr/>
           <a:lstStyle/>
           <a:p>
-            <a:endParaRPr lang="fr-CH"/>
-          </a:p>
-        </p:txBody>
-      </p:sp>
-      <p:sp>
-        <p:nvSpPr>
-          <p:cNvPr id="3" name="Espace réservé du contenu 2"/>
-          <p:cNvSpPr>
-            <a:spLocks noGrp="1"/>
-          </p:cNvSpPr>
-          <p:nvPr>
-            <p:ph idx="1"/>
-          </p:nvPr>
-        </p:nvSpPr>
-        <p:spPr/>
-        <p:txBody>
-          <a:bodyPr/>
-          <a:lstStyle/>
-          <a:p>
-            <a:endParaRPr lang="fr-CH"/>
+            <a:r>
+              <a:rPr lang="fr-CH" dirty="0" smtClean="0"/>
+              <a:t>Introduction</a:t>
+            </a:r>
+            <a:endParaRPr lang="fr-CH" dirty="0"/>
           </a:p>
         </p:txBody>
       </p:sp>
@@ -9722,6 +10457,126 @@
               <a:rPr lang="fr-CH" smtClean="0"/>
               <a:t>2</a:t>
             </a:fld>
+            <a:endParaRPr lang="fr-CH"/>
+          </a:p>
+        </p:txBody>
+      </p:sp>
+      <p:pic>
+        <p:nvPicPr>
+          <p:cNvPr id="5" name="Picture 2" descr="https://imageog.flaticon.com/icons/png/512/66/66163.png?size=1200x630f&amp;pad=10,10,10,10&amp;ext=png&amp;bg=FFFFFFFF"/>
+          <p:cNvPicPr>
+            <a:picLocks noChangeAspect="1" noChangeArrowheads="1"/>
+          </p:cNvPicPr>
+          <p:nvPr/>
+        </p:nvPicPr>
+        <p:blipFill>
+          <a:blip r:embed="rId2">
+            <a:extLst>
+              <a:ext uri="{28A0092B-C50C-407E-A947-70E740481C1C}">
+                <a14:useLocalDpi xmlns:a14="http://schemas.microsoft.com/office/drawing/2010/main" val="0"/>
+              </a:ext>
+            </a:extLst>
+          </a:blip>
+          <a:srcRect/>
+          <a:stretch>
+            <a:fillRect/>
+          </a:stretch>
+        </p:blipFill>
+        <p:spPr bwMode="auto">
+          <a:xfrm>
+            <a:off x="7012229" y="3284342"/>
+            <a:ext cx="1598371" cy="839144"/>
+          </a:xfrm>
+          <a:prstGeom prst="rect">
+            <a:avLst/>
+          </a:prstGeom>
+          <a:noFill/>
+          <a:extLst>
+            <a:ext uri="{909E8E84-426E-40DD-AFC4-6F175D3DCCD1}">
+              <a14:hiddenFill xmlns:a14="http://schemas.microsoft.com/office/drawing/2010/main">
+                <a:solidFill>
+                  <a:srgbClr val="FFFFFF"/>
+                </a:solidFill>
+              </a14:hiddenFill>
+            </a:ext>
+          </a:extLst>
+        </p:spPr>
+      </p:pic>
+      <p:pic>
+        <p:nvPicPr>
+          <p:cNvPr id="6" name="Picture 4" descr="https://cdn5.vectorstock.com/i/1000x1000/30/54/stressed-businessman-icon-isometric-3d-style-vector-9063054.jpg"/>
+          <p:cNvPicPr>
+            <a:picLocks noChangeAspect="1" noChangeArrowheads="1"/>
+          </p:cNvPicPr>
+          <p:nvPr/>
+        </p:nvPicPr>
+        <p:blipFill rotWithShape="1">
+          <a:blip r:embed="rId3">
+            <a:extLst>
+              <a:ext uri="{28A0092B-C50C-407E-A947-70E740481C1C}">
+                <a14:useLocalDpi xmlns:a14="http://schemas.microsoft.com/office/drawing/2010/main" val="0"/>
+              </a:ext>
+            </a:extLst>
+          </a:blip>
+          <a:srcRect l="26231" t="15454" r="26909" b="22028"/>
+          <a:stretch/>
+        </p:blipFill>
+        <p:spPr bwMode="auto">
+          <a:xfrm>
+            <a:off x="4138167" y="2437966"/>
+            <a:ext cx="1532238" cy="2207741"/>
+          </a:xfrm>
+          <a:prstGeom prst="rect">
+            <a:avLst/>
+          </a:prstGeom>
+          <a:noFill/>
+          <a:extLst>
+            <a:ext uri="{909E8E84-426E-40DD-AFC4-6F175D3DCCD1}">
+              <a14:hiddenFill xmlns:a14="http://schemas.microsoft.com/office/drawing/2010/main">
+                <a:solidFill>
+                  <a:srgbClr val="FFFFFF"/>
+                </a:solidFill>
+              </a14:hiddenFill>
+            </a:ext>
+          </a:extLst>
+        </p:spPr>
+      </p:pic>
+      <p:sp>
+        <p:nvSpPr>
+          <p:cNvPr id="7" name="Flèche droite 6"/>
+          <p:cNvSpPr/>
+          <p:nvPr/>
+        </p:nvSpPr>
+        <p:spPr>
+          <a:xfrm>
+            <a:off x="6024632" y="3587244"/>
+            <a:ext cx="987597" cy="233339"/>
+          </a:xfrm>
+          <a:prstGeom prst="rightArrow">
+            <a:avLst/>
+          </a:prstGeom>
+        </p:spPr>
+        <p:style>
+          <a:lnRef idx="2">
+            <a:schemeClr val="accent1">
+              <a:shade val="50000"/>
+            </a:schemeClr>
+          </a:lnRef>
+          <a:fillRef idx="1">
+            <a:schemeClr val="accent1"/>
+          </a:fillRef>
+          <a:effectRef idx="0">
+            <a:schemeClr val="accent1"/>
+          </a:effectRef>
+          <a:fontRef idx="minor">
+            <a:schemeClr val="lt1"/>
+          </a:fontRef>
+        </p:style>
+        <p:txBody>
+          <a:bodyPr rtlCol="0" anchor="ctr"/>
+          <a:lstStyle/>
+          <a:p>
+            <a:pPr algn="ctr"/>
             <a:endParaRPr lang="fr-CH"/>
           </a:p>
         </p:txBody>
@@ -9736,6 +10591,13 @@
   <p:clrMapOvr>
     <a:masterClrMapping/>
   </p:clrMapOvr>
+  <p:timing>
+    <p:tnLst>
+      <p:par>
+        <p:cTn id="1" dur="indefinite" restart="never" nodeType="tmRoot"/>
+      </p:par>
+    </p:tnLst>
+  </p:timing>
 </p:sld>
 </file>
 
@@ -9772,20 +10634,21 @@
           <a:lstStyle/>
           <a:p>
             <a:r>
-              <a:rPr lang="fr-CH" dirty="0"/>
-              <a:t>Merci pour votre attention</a:t>
-            </a:r>
-          </a:p>
-        </p:txBody>
-      </p:sp>
-      <p:sp>
-        <p:nvSpPr>
-          <p:cNvPr id="3" name="Espace réservé du texte 2"/>
-          <p:cNvSpPr>
-            <a:spLocks noGrp="1"/>
-          </p:cNvSpPr>
-          <p:nvPr>
-            <p:ph type="body" idx="1"/>
+              <a:rPr lang="fr-CH" dirty="0" smtClean="0"/>
+              <a:t>Introduction</a:t>
+            </a:r>
+            <a:endParaRPr lang="fr-CH" dirty="0"/>
+          </a:p>
+        </p:txBody>
+      </p:sp>
+      <p:sp>
+        <p:nvSpPr>
+          <p:cNvPr id="3" name="Espace réservé du contenu 2"/>
+          <p:cNvSpPr>
+            <a:spLocks noGrp="1"/>
+          </p:cNvSpPr>
+          <p:nvPr>
+            <p:ph idx="1"/>
           </p:nvPr>
         </p:nvSpPr>
         <p:spPr/>
@@ -9812,7 +10675,7 @@
           <a:bodyPr/>
           <a:lstStyle/>
           <a:p>
-            <a:fld id="{5C659214-C5B2-4878-BE63-6680446A108B}" type="slidenum">
+            <a:fld id="{F60449C3-8BCD-4455-8E2A-A866209B9601}" type="slidenum">
               <a:rPr lang="fr-CH" smtClean="0"/>
               <a:t>3</a:t>
             </a:fld>
@@ -9820,16 +10683,1239 @@
           </a:p>
         </p:txBody>
       </p:sp>
+      <p:pic>
+        <p:nvPicPr>
+          <p:cNvPr id="5" name="Image 4"/>
+          <p:cNvPicPr>
+            <a:picLocks noChangeAspect="1"/>
+          </p:cNvPicPr>
+          <p:nvPr/>
+        </p:nvPicPr>
+        <p:blipFill>
+          <a:blip r:embed="rId2"/>
+          <a:stretch>
+            <a:fillRect/>
+          </a:stretch>
+        </p:blipFill>
+        <p:spPr>
+          <a:xfrm>
+            <a:off x="1416907" y="1533008"/>
+            <a:ext cx="9176953" cy="5163459"/>
+          </a:xfrm>
+          <a:prstGeom prst="rect">
+            <a:avLst/>
+          </a:prstGeom>
+        </p:spPr>
+      </p:pic>
     </p:spTree>
     <p:extLst>
       <p:ext uri="{BB962C8B-B14F-4D97-AF65-F5344CB8AC3E}">
-        <p14:creationId xmlns:p14="http://schemas.microsoft.com/office/powerpoint/2010/main" val="2003252175"/>
+        <p14:creationId xmlns:p14="http://schemas.microsoft.com/office/powerpoint/2010/main" val="3408379731"/>
       </p:ext>
     </p:extLst>
   </p:cSld>
   <p:clrMapOvr>
     <a:masterClrMapping/>
   </p:clrMapOvr>
+  <p:timing>
+    <p:tnLst>
+      <p:par>
+        <p:cTn id="1" dur="indefinite" restart="never" nodeType="tmRoot"/>
+      </p:par>
+    </p:tnLst>
+  </p:timing>
+</p:sld>
+</file>
+
+<file path=ppt/slides/slide4.xml><?xml version="1.0" encoding="utf-8"?>
+<p:sld xmlns:a="http://schemas.openxmlformats.org/drawingml/2006/main" xmlns:r="http://schemas.openxmlformats.org/officeDocument/2006/relationships" xmlns:p="http://schemas.openxmlformats.org/presentationml/2006/main">
+  <p:cSld>
+    <p:spTree>
+      <p:nvGrpSpPr>
+        <p:cNvPr id="1" name=""/>
+        <p:cNvGrpSpPr/>
+        <p:nvPr/>
+      </p:nvGrpSpPr>
+      <p:grpSpPr>
+        <a:xfrm>
+          <a:off x="0" y="0"/>
+          <a:ext cx="0" cy="0"/>
+          <a:chOff x="0" y="0"/>
+          <a:chExt cx="0" cy="0"/>
+        </a:xfrm>
+      </p:grpSpPr>
+      <p:sp>
+        <p:nvSpPr>
+          <p:cNvPr id="2" name="Titre 1"/>
+          <p:cNvSpPr>
+            <a:spLocks noGrp="1"/>
+          </p:cNvSpPr>
+          <p:nvPr>
+            <p:ph type="title"/>
+          </p:nvPr>
+        </p:nvSpPr>
+        <p:spPr/>
+        <p:txBody>
+          <a:bodyPr/>
+          <a:lstStyle/>
+          <a:p>
+            <a:r>
+              <a:rPr lang="fr-CH" dirty="0" smtClean="0"/>
+              <a:t>Diagramme du système</a:t>
+            </a:r>
+            <a:endParaRPr lang="fr-CH" dirty="0"/>
+          </a:p>
+        </p:txBody>
+      </p:sp>
+      <p:pic>
+        <p:nvPicPr>
+          <p:cNvPr id="5" name="Espace réservé du contenu 4"/>
+          <p:cNvPicPr>
+            <a:picLocks noGrp="1" noChangeAspect="1"/>
+          </p:cNvPicPr>
+          <p:nvPr>
+            <p:ph idx="1"/>
+          </p:nvPr>
+        </p:nvPicPr>
+        <p:blipFill>
+          <a:blip r:embed="rId2">
+            <a:extLst>
+              <a:ext uri="{28A0092B-C50C-407E-A947-70E740481C1C}">
+                <a14:useLocalDpi xmlns:a14="http://schemas.microsoft.com/office/drawing/2010/main" val="0"/>
+              </a:ext>
+            </a:extLst>
+          </a:blip>
+          <a:stretch>
+            <a:fillRect/>
+          </a:stretch>
+        </p:blipFill>
+        <p:spPr>
+          <a:xfrm>
+            <a:off x="3648075" y="2059441"/>
+            <a:ext cx="4962525" cy="3914775"/>
+          </a:xfrm>
+        </p:spPr>
+      </p:pic>
+      <p:sp>
+        <p:nvSpPr>
+          <p:cNvPr id="4" name="Espace réservé du numéro de diapositive 3"/>
+          <p:cNvSpPr>
+            <a:spLocks noGrp="1"/>
+          </p:cNvSpPr>
+          <p:nvPr>
+            <p:ph type="sldNum" sz="quarter" idx="12"/>
+          </p:nvPr>
+        </p:nvSpPr>
+        <p:spPr/>
+        <p:txBody>
+          <a:bodyPr/>
+          <a:lstStyle/>
+          <a:p>
+            <a:fld id="{F60449C3-8BCD-4455-8E2A-A866209B9601}" type="slidenum">
+              <a:rPr lang="fr-CH" smtClean="0"/>
+              <a:t>4</a:t>
+            </a:fld>
+            <a:endParaRPr lang="fr-CH"/>
+          </a:p>
+        </p:txBody>
+      </p:sp>
+    </p:spTree>
+    <p:extLst>
+      <p:ext uri="{BB962C8B-B14F-4D97-AF65-F5344CB8AC3E}">
+        <p14:creationId xmlns:p14="http://schemas.microsoft.com/office/powerpoint/2010/main" val="2078683396"/>
+      </p:ext>
+    </p:extLst>
+  </p:cSld>
+  <p:clrMapOvr>
+    <a:masterClrMapping/>
+  </p:clrMapOvr>
+  <p:timing>
+    <p:tnLst>
+      <p:par>
+        <p:cTn id="1" dur="indefinite" restart="never" nodeType="tmRoot"/>
+      </p:par>
+    </p:tnLst>
+  </p:timing>
+</p:sld>
+</file>
+
+<file path=ppt/slides/slide5.xml><?xml version="1.0" encoding="utf-8"?>
+<p:sld xmlns:a="http://schemas.openxmlformats.org/drawingml/2006/main" xmlns:r="http://schemas.openxmlformats.org/officeDocument/2006/relationships" xmlns:p="http://schemas.openxmlformats.org/presentationml/2006/main">
+  <p:cSld>
+    <p:spTree>
+      <p:nvGrpSpPr>
+        <p:cNvPr id="1" name=""/>
+        <p:cNvGrpSpPr/>
+        <p:nvPr/>
+      </p:nvGrpSpPr>
+      <p:grpSpPr>
+        <a:xfrm>
+          <a:off x="0" y="0"/>
+          <a:ext cx="0" cy="0"/>
+          <a:chOff x="0" y="0"/>
+          <a:chExt cx="0" cy="0"/>
+        </a:xfrm>
+      </p:grpSpPr>
+      <p:sp>
+        <p:nvSpPr>
+          <p:cNvPr id="2" name="Titre 1"/>
+          <p:cNvSpPr>
+            <a:spLocks noGrp="1"/>
+          </p:cNvSpPr>
+          <p:nvPr>
+            <p:ph type="title"/>
+          </p:nvPr>
+        </p:nvSpPr>
+        <p:spPr/>
+        <p:txBody>
+          <a:bodyPr/>
+          <a:lstStyle/>
+          <a:p>
+            <a:r>
+              <a:rPr lang="fr-CH" dirty="0" smtClean="0"/>
+              <a:t>Description technique</a:t>
+            </a:r>
+            <a:endParaRPr lang="fr-CH" dirty="0"/>
+          </a:p>
+        </p:txBody>
+      </p:sp>
+      <p:sp>
+        <p:nvSpPr>
+          <p:cNvPr id="4" name="Espace réservé du numéro de diapositive 3"/>
+          <p:cNvSpPr>
+            <a:spLocks noGrp="1"/>
+          </p:cNvSpPr>
+          <p:nvPr>
+            <p:ph type="sldNum" sz="quarter" idx="12"/>
+          </p:nvPr>
+        </p:nvSpPr>
+        <p:spPr/>
+        <p:txBody>
+          <a:bodyPr/>
+          <a:lstStyle/>
+          <a:p>
+            <a:fld id="{F60449C3-8BCD-4455-8E2A-A866209B9601}" type="slidenum">
+              <a:rPr lang="fr-CH" smtClean="0"/>
+              <a:t>5</a:t>
+            </a:fld>
+            <a:endParaRPr lang="fr-CH" dirty="0"/>
+          </a:p>
+        </p:txBody>
+      </p:sp>
+      <p:pic>
+        <p:nvPicPr>
+          <p:cNvPr id="7" name="Image 6"/>
+          <p:cNvPicPr>
+            <a:picLocks noChangeAspect="1"/>
+          </p:cNvPicPr>
+          <p:nvPr/>
+        </p:nvPicPr>
+        <p:blipFill>
+          <a:blip r:embed="rId2"/>
+          <a:stretch>
+            <a:fillRect/>
+          </a:stretch>
+        </p:blipFill>
+        <p:spPr>
+          <a:xfrm>
+            <a:off x="2407296" y="2505676"/>
+            <a:ext cx="1234035" cy="930876"/>
+          </a:xfrm>
+          <a:prstGeom prst="rect">
+            <a:avLst/>
+          </a:prstGeom>
+        </p:spPr>
+      </p:pic>
+      <p:sp>
+        <p:nvSpPr>
+          <p:cNvPr id="8" name="ZoneTexte 7"/>
+          <p:cNvSpPr txBox="1"/>
+          <p:nvPr/>
+        </p:nvSpPr>
+        <p:spPr>
+          <a:xfrm>
+            <a:off x="2308442" y="3664479"/>
+            <a:ext cx="1203727" cy="369332"/>
+          </a:xfrm>
+          <a:prstGeom prst="rect">
+            <a:avLst/>
+          </a:prstGeom>
+          <a:noFill/>
+        </p:spPr>
+        <p:txBody>
+          <a:bodyPr wrap="none" rtlCol="0">
+            <a:spAutoFit/>
+          </a:bodyPr>
+          <a:lstStyle/>
+          <a:p>
+            <a:r>
+              <a:rPr lang="fr-CH" dirty="0" smtClean="0"/>
+              <a:t>Calibration</a:t>
+            </a:r>
+            <a:endParaRPr lang="fr-CH" dirty="0"/>
+          </a:p>
+        </p:txBody>
+      </p:sp>
+      <p:pic>
+        <p:nvPicPr>
+          <p:cNvPr id="9" name="Picture 2" descr="https://imageog.flaticon.com/icons/png/512/66/66163.png?size=1200x630f&amp;pad=10,10,10,10&amp;ext=png&amp;bg=FFFFFFFF"/>
+          <p:cNvPicPr>
+            <a:picLocks noChangeAspect="1" noChangeArrowheads="1"/>
+          </p:cNvPicPr>
+          <p:nvPr/>
+        </p:nvPicPr>
+        <p:blipFill>
+          <a:blip r:embed="rId3">
+            <a:extLst>
+              <a:ext uri="{28A0092B-C50C-407E-A947-70E740481C1C}">
+                <a14:useLocalDpi xmlns:a14="http://schemas.microsoft.com/office/drawing/2010/main" val="0"/>
+              </a:ext>
+            </a:extLst>
+          </a:blip>
+          <a:srcRect/>
+          <a:stretch>
+            <a:fillRect/>
+          </a:stretch>
+        </p:blipFill>
+        <p:spPr bwMode="auto">
+          <a:xfrm>
+            <a:off x="5066284" y="2505676"/>
+            <a:ext cx="1652893" cy="867768"/>
+          </a:xfrm>
+          <a:prstGeom prst="rect">
+            <a:avLst/>
+          </a:prstGeom>
+          <a:noFill/>
+          <a:extLst>
+            <a:ext uri="{909E8E84-426E-40DD-AFC4-6F175D3DCCD1}">
+              <a14:hiddenFill xmlns:a14="http://schemas.microsoft.com/office/drawing/2010/main">
+                <a:solidFill>
+                  <a:srgbClr val="FFFFFF"/>
+                </a:solidFill>
+              </a14:hiddenFill>
+            </a:ext>
+          </a:extLst>
+        </p:spPr>
+      </p:pic>
+      <p:sp>
+        <p:nvSpPr>
+          <p:cNvPr id="10" name="ZoneTexte 9"/>
+          <p:cNvSpPr txBox="1"/>
+          <p:nvPr/>
+        </p:nvSpPr>
+        <p:spPr>
+          <a:xfrm>
+            <a:off x="5015407" y="3527587"/>
+            <a:ext cx="1754646" cy="646331"/>
+          </a:xfrm>
+          <a:prstGeom prst="rect">
+            <a:avLst/>
+          </a:prstGeom>
+          <a:noFill/>
+        </p:spPr>
+        <p:txBody>
+          <a:bodyPr wrap="square" rtlCol="0">
+            <a:spAutoFit/>
+          </a:bodyPr>
+          <a:lstStyle/>
+          <a:p>
+            <a:pPr algn="ctr"/>
+            <a:r>
+              <a:rPr lang="fr-CH" dirty="0" smtClean="0"/>
+              <a:t>Déclencher le ralentissement</a:t>
+            </a:r>
+            <a:endParaRPr lang="fr-CH" dirty="0"/>
+          </a:p>
+        </p:txBody>
+      </p:sp>
+      <p:pic>
+        <p:nvPicPr>
+          <p:cNvPr id="11" name="Image 10"/>
+          <p:cNvPicPr>
+            <a:picLocks noChangeAspect="1"/>
+          </p:cNvPicPr>
+          <p:nvPr/>
+        </p:nvPicPr>
+        <p:blipFill>
+          <a:blip r:embed="rId4">
+            <a:extLst>
+              <a:ext uri="{28A0092B-C50C-407E-A947-70E740481C1C}">
+                <a14:useLocalDpi xmlns:a14="http://schemas.microsoft.com/office/drawing/2010/main" val="0"/>
+              </a:ext>
+            </a:extLst>
+          </a:blip>
+          <a:stretch>
+            <a:fillRect/>
+          </a:stretch>
+        </p:blipFill>
+        <p:spPr>
+          <a:xfrm>
+            <a:off x="8367780" y="2278878"/>
+            <a:ext cx="1227908" cy="1227908"/>
+          </a:xfrm>
+          <a:prstGeom prst="rect">
+            <a:avLst/>
+          </a:prstGeom>
+        </p:spPr>
+      </p:pic>
+      <p:sp>
+        <p:nvSpPr>
+          <p:cNvPr id="12" name="ZoneTexte 11"/>
+          <p:cNvSpPr txBox="1"/>
+          <p:nvPr/>
+        </p:nvSpPr>
+        <p:spPr>
+          <a:xfrm>
+            <a:off x="7736212" y="3526784"/>
+            <a:ext cx="2491045" cy="646331"/>
+          </a:xfrm>
+          <a:prstGeom prst="rect">
+            <a:avLst/>
+          </a:prstGeom>
+          <a:noFill/>
+        </p:spPr>
+        <p:txBody>
+          <a:bodyPr wrap="square" rtlCol="0">
+            <a:spAutoFit/>
+          </a:bodyPr>
+          <a:lstStyle/>
+          <a:p>
+            <a:pPr algn="ctr"/>
+            <a:r>
+              <a:rPr lang="fr-CH" dirty="0"/>
+              <a:t>Adapter la difficulté dynamiquement</a:t>
+            </a:r>
+          </a:p>
+        </p:txBody>
+      </p:sp>
+      <p:sp>
+        <p:nvSpPr>
+          <p:cNvPr id="16" name="ZoneTexte 15"/>
+          <p:cNvSpPr txBox="1"/>
+          <p:nvPr/>
+        </p:nvSpPr>
+        <p:spPr>
+          <a:xfrm>
+            <a:off x="1986541" y="4833043"/>
+            <a:ext cx="2075543" cy="523220"/>
+          </a:xfrm>
+          <a:prstGeom prst="rect">
+            <a:avLst/>
+          </a:prstGeom>
+          <a:noFill/>
+        </p:spPr>
+        <p:txBody>
+          <a:bodyPr wrap="square" rtlCol="0">
+            <a:spAutoFit/>
+          </a:bodyPr>
+          <a:lstStyle/>
+          <a:p>
+            <a:pPr marL="285750" indent="-285750">
+              <a:buFont typeface="Arial" panose="020B0604020202020204" pitchFamily="34" charset="0"/>
+              <a:buChar char="•"/>
+            </a:pPr>
+            <a:r>
+              <a:rPr lang="fr-CH" sz="1400" dirty="0" smtClean="0"/>
+              <a:t>Permet l’obtention d’un </a:t>
+            </a:r>
+            <a:r>
+              <a:rPr lang="fr-CH" sz="1400" dirty="0" smtClean="0">
+                <a:solidFill>
+                  <a:srgbClr val="1CADE4"/>
+                </a:solidFill>
+              </a:rPr>
+              <a:t>BPM moyen</a:t>
+            </a:r>
+            <a:endParaRPr lang="fr-CH" sz="1400" dirty="0">
+              <a:solidFill>
+                <a:srgbClr val="1CADE4"/>
+              </a:solidFill>
+            </a:endParaRPr>
+          </a:p>
+        </p:txBody>
+      </p:sp>
+      <p:sp>
+        <p:nvSpPr>
+          <p:cNvPr id="19" name="ZoneTexte 18"/>
+          <p:cNvSpPr txBox="1"/>
+          <p:nvPr/>
+        </p:nvSpPr>
+        <p:spPr>
+          <a:xfrm>
+            <a:off x="4557662" y="4833043"/>
+            <a:ext cx="2844222" cy="954107"/>
+          </a:xfrm>
+          <a:prstGeom prst="rect">
+            <a:avLst/>
+          </a:prstGeom>
+          <a:noFill/>
+        </p:spPr>
+        <p:txBody>
+          <a:bodyPr wrap="square" rtlCol="0">
+            <a:spAutoFit/>
+          </a:bodyPr>
+          <a:lstStyle/>
+          <a:p>
+            <a:pPr marL="285750" indent="-285750">
+              <a:buFont typeface="Arial" panose="020B0604020202020204" pitchFamily="34" charset="0"/>
+              <a:buChar char="•"/>
+            </a:pPr>
+            <a:r>
+              <a:rPr lang="fr-CH" sz="1400" dirty="0" smtClean="0"/>
+              <a:t>Seuil: 1.3 * </a:t>
+            </a:r>
+            <a:r>
+              <a:rPr lang="fr-CH" sz="1400" dirty="0" smtClean="0">
+                <a:solidFill>
+                  <a:srgbClr val="1CADE4"/>
+                </a:solidFill>
+              </a:rPr>
+              <a:t>BPM</a:t>
+            </a:r>
+            <a:r>
+              <a:rPr lang="fr-CH" sz="1400" dirty="0" smtClean="0"/>
+              <a:t> </a:t>
+            </a:r>
+            <a:r>
+              <a:rPr lang="fr-CH" sz="1400" dirty="0" smtClean="0">
+                <a:solidFill>
+                  <a:srgbClr val="1CADE4"/>
+                </a:solidFill>
+              </a:rPr>
+              <a:t>moyen</a:t>
+            </a:r>
+          </a:p>
+          <a:p>
+            <a:pPr marL="285750" indent="-285750">
+              <a:buFont typeface="Arial" panose="020B0604020202020204" pitchFamily="34" charset="0"/>
+              <a:buChar char="•"/>
+            </a:pPr>
+            <a:r>
+              <a:rPr lang="fr-CH" sz="1400" dirty="0" smtClean="0"/>
+              <a:t>Durée: 6 secondes</a:t>
+            </a:r>
+          </a:p>
+          <a:p>
+            <a:pPr marL="285750" indent="-285750">
+              <a:buFont typeface="Arial" panose="020B0604020202020204" pitchFamily="34" charset="0"/>
+              <a:buChar char="•"/>
+            </a:pPr>
+            <a:r>
+              <a:rPr lang="fr-CH" sz="1400" dirty="0" smtClean="0"/>
+              <a:t>Ralentissement à 40% de vitesse originale</a:t>
+            </a:r>
+            <a:endParaRPr lang="fr-CH" sz="1400" dirty="0"/>
+          </a:p>
+        </p:txBody>
+      </p:sp>
+      <p:sp>
+        <p:nvSpPr>
+          <p:cNvPr id="21" name="ZoneTexte 20"/>
+          <p:cNvSpPr txBox="1"/>
+          <p:nvPr/>
+        </p:nvSpPr>
+        <p:spPr>
+          <a:xfrm>
+            <a:off x="7897462" y="4838649"/>
+            <a:ext cx="3084038" cy="738664"/>
+          </a:xfrm>
+          <a:prstGeom prst="rect">
+            <a:avLst/>
+          </a:prstGeom>
+          <a:noFill/>
+        </p:spPr>
+        <p:txBody>
+          <a:bodyPr wrap="square" rtlCol="0">
+            <a:spAutoFit/>
+          </a:bodyPr>
+          <a:lstStyle/>
+          <a:p>
+            <a:pPr marL="285750" indent="-285750">
+              <a:buFont typeface="Arial" panose="020B0604020202020204" pitchFamily="34" charset="0"/>
+              <a:buChar char="•"/>
+            </a:pPr>
+            <a:r>
+              <a:rPr lang="fr-CH" sz="1400" dirty="0" smtClean="0"/>
+              <a:t>Seuil «Calme»: 1.05 * </a:t>
+            </a:r>
+            <a:r>
+              <a:rPr lang="fr-CH" sz="1400" dirty="0" smtClean="0">
+                <a:solidFill>
+                  <a:srgbClr val="1CADE4"/>
+                </a:solidFill>
+              </a:rPr>
+              <a:t>BPM</a:t>
+            </a:r>
+            <a:r>
+              <a:rPr lang="fr-CH" sz="1400" dirty="0" smtClean="0"/>
+              <a:t> </a:t>
+            </a:r>
+            <a:r>
+              <a:rPr lang="fr-CH" sz="1400" dirty="0" smtClean="0">
+                <a:solidFill>
+                  <a:srgbClr val="1CADE4"/>
+                </a:solidFill>
+              </a:rPr>
+              <a:t>moyen</a:t>
+            </a:r>
+          </a:p>
+          <a:p>
+            <a:pPr marL="285750" indent="-285750">
+              <a:buFont typeface="Arial" panose="020B0604020202020204" pitchFamily="34" charset="0"/>
+              <a:buChar char="•"/>
+            </a:pPr>
+            <a:r>
+              <a:rPr lang="fr-CH" sz="1400" dirty="0" smtClean="0"/>
+              <a:t>Seuil «Stressé»: 1.2 * </a:t>
+            </a:r>
+            <a:r>
+              <a:rPr lang="fr-CH" sz="1400" dirty="0" smtClean="0">
+                <a:solidFill>
+                  <a:srgbClr val="1CADE4"/>
+                </a:solidFill>
+              </a:rPr>
+              <a:t>BPM</a:t>
+            </a:r>
+            <a:r>
+              <a:rPr lang="fr-CH" sz="1400" dirty="0" smtClean="0"/>
+              <a:t> </a:t>
+            </a:r>
+            <a:r>
+              <a:rPr lang="fr-CH" sz="1400" dirty="0" smtClean="0">
+                <a:solidFill>
+                  <a:srgbClr val="1CADE4"/>
+                </a:solidFill>
+              </a:rPr>
+              <a:t>moyen</a:t>
+            </a:r>
+          </a:p>
+          <a:p>
+            <a:pPr marL="285750" indent="-285750">
+              <a:buFont typeface="Arial" panose="020B0604020202020204" pitchFamily="34" charset="0"/>
+              <a:buChar char="•"/>
+            </a:pPr>
+            <a:r>
+              <a:rPr lang="fr-CH" sz="1400" dirty="0" smtClean="0"/>
+              <a:t>Chaque seconde difficulté adaptée</a:t>
+            </a:r>
+          </a:p>
+        </p:txBody>
+      </p:sp>
+    </p:spTree>
+    <p:extLst>
+      <p:ext uri="{BB962C8B-B14F-4D97-AF65-F5344CB8AC3E}">
+        <p14:creationId xmlns:p14="http://schemas.microsoft.com/office/powerpoint/2010/main" val="2052836304"/>
+      </p:ext>
+    </p:extLst>
+  </p:cSld>
+  <p:clrMapOvr>
+    <a:masterClrMapping/>
+  </p:clrMapOvr>
+  <p:timing>
+    <p:tnLst>
+      <p:par>
+        <p:cTn id="1" dur="indefinite" restart="never" nodeType="tmRoot"/>
+      </p:par>
+    </p:tnLst>
+  </p:timing>
+</p:sld>
+</file>
+
+<file path=ppt/slides/slide6.xml><?xml version="1.0" encoding="utf-8"?>
+<p:sld xmlns:a="http://schemas.openxmlformats.org/drawingml/2006/main" xmlns:r="http://schemas.openxmlformats.org/officeDocument/2006/relationships" xmlns:p="http://schemas.openxmlformats.org/presentationml/2006/main">
+  <p:cSld>
+    <p:spTree>
+      <p:nvGrpSpPr>
+        <p:cNvPr id="1" name=""/>
+        <p:cNvGrpSpPr/>
+        <p:nvPr/>
+      </p:nvGrpSpPr>
+      <p:grpSpPr>
+        <a:xfrm>
+          <a:off x="0" y="0"/>
+          <a:ext cx="0" cy="0"/>
+          <a:chOff x="0" y="0"/>
+          <a:chExt cx="0" cy="0"/>
+        </a:xfrm>
+      </p:grpSpPr>
+      <p:sp>
+        <p:nvSpPr>
+          <p:cNvPr id="2" name="Titre 1"/>
+          <p:cNvSpPr>
+            <a:spLocks noGrp="1"/>
+          </p:cNvSpPr>
+          <p:nvPr>
+            <p:ph type="title"/>
+          </p:nvPr>
+        </p:nvSpPr>
+        <p:spPr/>
+        <p:txBody>
+          <a:bodyPr/>
+          <a:lstStyle/>
+          <a:p>
+            <a:r>
+              <a:rPr lang="fr-CH" dirty="0" smtClean="0"/>
+              <a:t>Mode d’évaluation prévu</a:t>
+            </a:r>
+            <a:endParaRPr lang="fr-CH" dirty="0"/>
+          </a:p>
+        </p:txBody>
+      </p:sp>
+      <p:sp>
+        <p:nvSpPr>
+          <p:cNvPr id="4" name="Espace réservé du numéro de diapositive 3"/>
+          <p:cNvSpPr>
+            <a:spLocks noGrp="1"/>
+          </p:cNvSpPr>
+          <p:nvPr>
+            <p:ph type="sldNum" sz="quarter" idx="12"/>
+          </p:nvPr>
+        </p:nvSpPr>
+        <p:spPr/>
+        <p:txBody>
+          <a:bodyPr/>
+          <a:lstStyle/>
+          <a:p>
+            <a:fld id="{F60449C3-8BCD-4455-8E2A-A866209B9601}" type="slidenum">
+              <a:rPr lang="fr-CH" smtClean="0"/>
+              <a:t>6</a:t>
+            </a:fld>
+            <a:endParaRPr lang="fr-CH"/>
+          </a:p>
+        </p:txBody>
+      </p:sp>
+      <p:sp>
+        <p:nvSpPr>
+          <p:cNvPr id="5" name="ZoneTexte 4"/>
+          <p:cNvSpPr txBox="1"/>
+          <p:nvPr/>
+        </p:nvSpPr>
+        <p:spPr>
+          <a:xfrm>
+            <a:off x="734999" y="2791416"/>
+            <a:ext cx="1851789" cy="523220"/>
+          </a:xfrm>
+          <a:prstGeom prst="rect">
+            <a:avLst/>
+          </a:prstGeom>
+          <a:noFill/>
+        </p:spPr>
+        <p:txBody>
+          <a:bodyPr wrap="none" rtlCol="0">
+            <a:spAutoFit/>
+          </a:bodyPr>
+          <a:lstStyle/>
+          <a:p>
+            <a:r>
+              <a:rPr lang="fr-CH" sz="2800" dirty="0"/>
+              <a:t>Hypothèse:</a:t>
+            </a:r>
+          </a:p>
+        </p:txBody>
+      </p:sp>
+      <p:sp>
+        <p:nvSpPr>
+          <p:cNvPr id="6" name="Espace réservé du contenu 2"/>
+          <p:cNvSpPr>
+            <a:spLocks noGrp="1"/>
+          </p:cNvSpPr>
+          <p:nvPr>
+            <p:ph idx="1"/>
+          </p:nvPr>
+        </p:nvSpPr>
+        <p:spPr>
+          <a:xfrm>
+            <a:off x="734999" y="3665545"/>
+            <a:ext cx="8596668" cy="1219494"/>
+          </a:xfrm>
+        </p:spPr>
+        <p:txBody>
+          <a:bodyPr>
+            <a:normAutofit/>
+          </a:bodyPr>
+          <a:lstStyle/>
+          <a:p>
+            <a:r>
+              <a:rPr lang="fr-FR" sz="1600" dirty="0" smtClean="0"/>
+              <a:t>Le ralentissement aide le joueur à se calmer</a:t>
+            </a:r>
+          </a:p>
+          <a:p>
+            <a:r>
+              <a:rPr lang="fr-FR" sz="1600" dirty="0" smtClean="0"/>
+              <a:t>Les hexagones augmentent le niveau de stresse du joueur</a:t>
+            </a:r>
+          </a:p>
+          <a:p>
+            <a:r>
+              <a:rPr lang="fr-FR" sz="1600" dirty="0" smtClean="0"/>
+              <a:t>Les indicateurs visuels/auditifs augmentent le niveau de stresse du joueur</a:t>
+            </a:r>
+          </a:p>
+        </p:txBody>
+      </p:sp>
+    </p:spTree>
+    <p:extLst>
+      <p:ext uri="{BB962C8B-B14F-4D97-AF65-F5344CB8AC3E}">
+        <p14:creationId xmlns:p14="http://schemas.microsoft.com/office/powerpoint/2010/main" val="3200534092"/>
+      </p:ext>
+    </p:extLst>
+  </p:cSld>
+  <p:clrMapOvr>
+    <a:masterClrMapping/>
+  </p:clrMapOvr>
+  <p:timing>
+    <p:tnLst>
+      <p:par>
+        <p:cTn id="1" dur="indefinite" restart="never" nodeType="tmRoot"/>
+      </p:par>
+    </p:tnLst>
+  </p:timing>
+</p:sld>
+</file>
+
+<file path=ppt/slides/slide7.xml><?xml version="1.0" encoding="utf-8"?>
+<p:sld xmlns:a="http://schemas.openxmlformats.org/drawingml/2006/main" xmlns:r="http://schemas.openxmlformats.org/officeDocument/2006/relationships" xmlns:p="http://schemas.openxmlformats.org/presentationml/2006/main">
+  <p:cSld>
+    <p:spTree>
+      <p:nvGrpSpPr>
+        <p:cNvPr id="1" name=""/>
+        <p:cNvGrpSpPr/>
+        <p:nvPr/>
+      </p:nvGrpSpPr>
+      <p:grpSpPr>
+        <a:xfrm>
+          <a:off x="0" y="0"/>
+          <a:ext cx="0" cy="0"/>
+          <a:chOff x="0" y="0"/>
+          <a:chExt cx="0" cy="0"/>
+        </a:xfrm>
+      </p:grpSpPr>
+      <p:sp>
+        <p:nvSpPr>
+          <p:cNvPr id="2" name="Titre 1"/>
+          <p:cNvSpPr>
+            <a:spLocks noGrp="1"/>
+          </p:cNvSpPr>
+          <p:nvPr>
+            <p:ph type="title"/>
+          </p:nvPr>
+        </p:nvSpPr>
+        <p:spPr/>
+        <p:txBody>
+          <a:bodyPr/>
+          <a:lstStyle/>
+          <a:p>
+            <a:r>
+              <a:rPr lang="fr-CH" dirty="0"/>
+              <a:t>Mode d’évaluation prévu</a:t>
+            </a:r>
+          </a:p>
+        </p:txBody>
+      </p:sp>
+      <p:sp>
+        <p:nvSpPr>
+          <p:cNvPr id="4" name="Espace réservé du numéro de diapositive 3"/>
+          <p:cNvSpPr>
+            <a:spLocks noGrp="1"/>
+          </p:cNvSpPr>
+          <p:nvPr>
+            <p:ph type="sldNum" sz="quarter" idx="12"/>
+          </p:nvPr>
+        </p:nvSpPr>
+        <p:spPr/>
+        <p:txBody>
+          <a:bodyPr/>
+          <a:lstStyle/>
+          <a:p>
+            <a:fld id="{F60449C3-8BCD-4455-8E2A-A866209B9601}" type="slidenum">
+              <a:rPr lang="fr-CH" smtClean="0"/>
+              <a:t>7</a:t>
+            </a:fld>
+            <a:endParaRPr lang="fr-CH"/>
+          </a:p>
+        </p:txBody>
+      </p:sp>
+      <p:sp>
+        <p:nvSpPr>
+          <p:cNvPr id="5" name="ZoneTexte 4"/>
+          <p:cNvSpPr txBox="1"/>
+          <p:nvPr/>
+        </p:nvSpPr>
+        <p:spPr>
+          <a:xfrm>
+            <a:off x="743237" y="2799654"/>
+            <a:ext cx="3319370" cy="523220"/>
+          </a:xfrm>
+          <a:prstGeom prst="rect">
+            <a:avLst/>
+          </a:prstGeom>
+          <a:noFill/>
+        </p:spPr>
+        <p:txBody>
+          <a:bodyPr wrap="none" rtlCol="0">
+            <a:spAutoFit/>
+          </a:bodyPr>
+          <a:lstStyle/>
+          <a:p>
+            <a:r>
+              <a:rPr lang="fr-CH" sz="2800" dirty="0"/>
+              <a:t>Questionnaire initiale</a:t>
+            </a:r>
+          </a:p>
+        </p:txBody>
+      </p:sp>
+      <p:sp>
+        <p:nvSpPr>
+          <p:cNvPr id="6" name="Espace réservé du contenu 2"/>
+          <p:cNvSpPr>
+            <a:spLocks noGrp="1"/>
+          </p:cNvSpPr>
+          <p:nvPr>
+            <p:ph idx="1"/>
+          </p:nvPr>
+        </p:nvSpPr>
+        <p:spPr>
+          <a:xfrm>
+            <a:off x="743237" y="3710223"/>
+            <a:ext cx="3319370" cy="799363"/>
+          </a:xfrm>
+        </p:spPr>
+        <p:txBody>
+          <a:bodyPr>
+            <a:normAutofit/>
+          </a:bodyPr>
+          <a:lstStyle/>
+          <a:p>
+            <a:r>
+              <a:rPr lang="fr-FR" sz="1600" dirty="0" smtClean="0"/>
+              <a:t>Familiarité avec les jeux-vidéos</a:t>
+            </a:r>
+            <a:endParaRPr lang="fr-CH" sz="1200" dirty="0"/>
+          </a:p>
+          <a:p>
+            <a:r>
+              <a:rPr lang="fr-FR" sz="1600" dirty="0" smtClean="0"/>
+              <a:t>Stresse au quotidien</a:t>
+            </a:r>
+          </a:p>
+        </p:txBody>
+      </p:sp>
+    </p:spTree>
+    <p:extLst>
+      <p:ext uri="{BB962C8B-B14F-4D97-AF65-F5344CB8AC3E}">
+        <p14:creationId xmlns:p14="http://schemas.microsoft.com/office/powerpoint/2010/main" val="4284955040"/>
+      </p:ext>
+    </p:extLst>
+  </p:cSld>
+  <p:clrMapOvr>
+    <a:masterClrMapping/>
+  </p:clrMapOvr>
+  <p:timing>
+    <p:tnLst>
+      <p:par>
+        <p:cTn id="1" dur="indefinite" restart="never" nodeType="tmRoot"/>
+      </p:par>
+    </p:tnLst>
+  </p:timing>
+</p:sld>
+</file>
+
+<file path=ppt/slides/slide8.xml><?xml version="1.0" encoding="utf-8"?>
+<p:sld xmlns:a="http://schemas.openxmlformats.org/drawingml/2006/main" xmlns:r="http://schemas.openxmlformats.org/officeDocument/2006/relationships" xmlns:p="http://schemas.openxmlformats.org/presentationml/2006/main">
+  <p:cSld>
+    <p:spTree>
+      <p:nvGrpSpPr>
+        <p:cNvPr id="1" name=""/>
+        <p:cNvGrpSpPr/>
+        <p:nvPr/>
+      </p:nvGrpSpPr>
+      <p:grpSpPr>
+        <a:xfrm>
+          <a:off x="0" y="0"/>
+          <a:ext cx="0" cy="0"/>
+          <a:chOff x="0" y="0"/>
+          <a:chExt cx="0" cy="0"/>
+        </a:xfrm>
+      </p:grpSpPr>
+      <p:sp>
+        <p:nvSpPr>
+          <p:cNvPr id="2" name="Titre 1"/>
+          <p:cNvSpPr>
+            <a:spLocks noGrp="1"/>
+          </p:cNvSpPr>
+          <p:nvPr>
+            <p:ph type="title"/>
+          </p:nvPr>
+        </p:nvSpPr>
+        <p:spPr/>
+        <p:txBody>
+          <a:bodyPr/>
+          <a:lstStyle/>
+          <a:p>
+            <a:r>
+              <a:rPr lang="fr-CH" dirty="0"/>
+              <a:t>Mode d’évaluation prévu</a:t>
+            </a:r>
+          </a:p>
+        </p:txBody>
+      </p:sp>
+      <p:sp>
+        <p:nvSpPr>
+          <p:cNvPr id="4" name="Espace réservé du numéro de diapositive 3"/>
+          <p:cNvSpPr>
+            <a:spLocks noGrp="1"/>
+          </p:cNvSpPr>
+          <p:nvPr>
+            <p:ph type="sldNum" sz="quarter" idx="12"/>
+          </p:nvPr>
+        </p:nvSpPr>
+        <p:spPr/>
+        <p:txBody>
+          <a:bodyPr/>
+          <a:lstStyle/>
+          <a:p>
+            <a:fld id="{F60449C3-8BCD-4455-8E2A-A866209B9601}" type="slidenum">
+              <a:rPr lang="fr-CH" smtClean="0"/>
+              <a:t>8</a:t>
+            </a:fld>
+            <a:endParaRPr lang="fr-CH"/>
+          </a:p>
+        </p:txBody>
+      </p:sp>
+      <p:sp>
+        <p:nvSpPr>
+          <p:cNvPr id="5" name="ZoneTexte 4"/>
+          <p:cNvSpPr txBox="1"/>
+          <p:nvPr/>
+        </p:nvSpPr>
+        <p:spPr>
+          <a:xfrm>
+            <a:off x="743237" y="2799654"/>
+            <a:ext cx="3319370" cy="523220"/>
+          </a:xfrm>
+          <a:prstGeom prst="rect">
+            <a:avLst/>
+          </a:prstGeom>
+          <a:noFill/>
+        </p:spPr>
+        <p:txBody>
+          <a:bodyPr wrap="none" rtlCol="0">
+            <a:spAutoFit/>
+          </a:bodyPr>
+          <a:lstStyle/>
+          <a:p>
+            <a:r>
+              <a:rPr lang="fr-CH" sz="2800" dirty="0"/>
+              <a:t>Phase d’introduction</a:t>
+            </a:r>
+            <a:endParaRPr lang="fr-CH" sz="2800" dirty="0"/>
+          </a:p>
+        </p:txBody>
+      </p:sp>
+      <p:sp>
+        <p:nvSpPr>
+          <p:cNvPr id="6" name="Espace réservé du contenu 2"/>
+          <p:cNvSpPr>
+            <a:spLocks noGrp="1"/>
+          </p:cNvSpPr>
+          <p:nvPr>
+            <p:ph idx="1"/>
+          </p:nvPr>
+        </p:nvSpPr>
+        <p:spPr>
+          <a:xfrm>
+            <a:off x="743236" y="3710223"/>
+            <a:ext cx="4438363" cy="1323096"/>
+          </a:xfrm>
+        </p:spPr>
+        <p:txBody>
+          <a:bodyPr>
+            <a:normAutofit/>
+          </a:bodyPr>
+          <a:lstStyle/>
+          <a:p>
+            <a:r>
+              <a:rPr lang="fr-FR" sz="1600" dirty="0"/>
+              <a:t>Explication des règles</a:t>
+            </a:r>
+          </a:p>
+          <a:p>
+            <a:r>
+              <a:rPr lang="fr-FR" sz="1600" dirty="0"/>
+              <a:t>Jouer </a:t>
+            </a:r>
+            <a:r>
+              <a:rPr lang="fr-FR" sz="1600" dirty="0" smtClean="0"/>
+              <a:t>pour </a:t>
+            </a:r>
+            <a:r>
+              <a:rPr lang="fr-FR" sz="1600" dirty="0"/>
+              <a:t>se familiariser</a:t>
+            </a:r>
+            <a:endParaRPr lang="fr-CH" sz="1600" dirty="0"/>
+          </a:p>
+        </p:txBody>
+      </p:sp>
+    </p:spTree>
+    <p:extLst>
+      <p:ext uri="{BB962C8B-B14F-4D97-AF65-F5344CB8AC3E}">
+        <p14:creationId xmlns:p14="http://schemas.microsoft.com/office/powerpoint/2010/main" val="2994690250"/>
+      </p:ext>
+    </p:extLst>
+  </p:cSld>
+  <p:clrMapOvr>
+    <a:masterClrMapping/>
+  </p:clrMapOvr>
+  <p:timing>
+    <p:tnLst>
+      <p:par>
+        <p:cTn id="1" dur="indefinite" restart="never" nodeType="tmRoot"/>
+      </p:par>
+    </p:tnLst>
+  </p:timing>
+</p:sld>
+</file>
+
+<file path=ppt/slides/slide9.xml><?xml version="1.0" encoding="utf-8"?>
+<p:sld xmlns:a="http://schemas.openxmlformats.org/drawingml/2006/main" xmlns:r="http://schemas.openxmlformats.org/officeDocument/2006/relationships" xmlns:p="http://schemas.openxmlformats.org/presentationml/2006/main">
+  <p:cSld>
+    <p:spTree>
+      <p:nvGrpSpPr>
+        <p:cNvPr id="1" name=""/>
+        <p:cNvGrpSpPr/>
+        <p:nvPr/>
+      </p:nvGrpSpPr>
+      <p:grpSpPr>
+        <a:xfrm>
+          <a:off x="0" y="0"/>
+          <a:ext cx="0" cy="0"/>
+          <a:chOff x="0" y="0"/>
+          <a:chExt cx="0" cy="0"/>
+        </a:xfrm>
+      </p:grpSpPr>
+      <p:sp>
+        <p:nvSpPr>
+          <p:cNvPr id="2" name="Titre 1"/>
+          <p:cNvSpPr>
+            <a:spLocks noGrp="1"/>
+          </p:cNvSpPr>
+          <p:nvPr>
+            <p:ph type="title"/>
+          </p:nvPr>
+        </p:nvSpPr>
+        <p:spPr/>
+        <p:txBody>
+          <a:bodyPr/>
+          <a:lstStyle/>
+          <a:p>
+            <a:r>
+              <a:rPr lang="fr-CH" dirty="0"/>
+              <a:t>Mode d’évaluation prévu</a:t>
+            </a:r>
+          </a:p>
+        </p:txBody>
+      </p:sp>
+      <p:sp>
+        <p:nvSpPr>
+          <p:cNvPr id="4" name="Espace réservé du numéro de diapositive 3"/>
+          <p:cNvSpPr>
+            <a:spLocks noGrp="1"/>
+          </p:cNvSpPr>
+          <p:nvPr>
+            <p:ph type="sldNum" sz="quarter" idx="12"/>
+          </p:nvPr>
+        </p:nvSpPr>
+        <p:spPr/>
+        <p:txBody>
+          <a:bodyPr/>
+          <a:lstStyle/>
+          <a:p>
+            <a:fld id="{F60449C3-8BCD-4455-8E2A-A866209B9601}" type="slidenum">
+              <a:rPr lang="fr-CH" smtClean="0"/>
+              <a:t>9</a:t>
+            </a:fld>
+            <a:endParaRPr lang="fr-CH"/>
+          </a:p>
+        </p:txBody>
+      </p:sp>
+      <p:sp>
+        <p:nvSpPr>
+          <p:cNvPr id="5" name="ZoneTexte 4"/>
+          <p:cNvSpPr txBox="1"/>
+          <p:nvPr/>
+        </p:nvSpPr>
+        <p:spPr>
+          <a:xfrm>
+            <a:off x="743237" y="2799654"/>
+            <a:ext cx="1163267" cy="523220"/>
+          </a:xfrm>
+          <a:prstGeom prst="rect">
+            <a:avLst/>
+          </a:prstGeom>
+          <a:noFill/>
+        </p:spPr>
+        <p:txBody>
+          <a:bodyPr wrap="none" rtlCol="0">
+            <a:spAutoFit/>
+          </a:bodyPr>
+          <a:lstStyle/>
+          <a:p>
+            <a:r>
+              <a:rPr lang="fr-CH" sz="2800" dirty="0" smtClean="0"/>
+              <a:t>Tâches</a:t>
+            </a:r>
+            <a:endParaRPr lang="fr-CH" sz="2800" dirty="0"/>
+          </a:p>
+        </p:txBody>
+      </p:sp>
+      <p:sp>
+        <p:nvSpPr>
+          <p:cNvPr id="6" name="Espace réservé du contenu 2"/>
+          <p:cNvSpPr>
+            <a:spLocks noGrp="1"/>
+          </p:cNvSpPr>
+          <p:nvPr>
+            <p:ph idx="1"/>
+          </p:nvPr>
+        </p:nvSpPr>
+        <p:spPr>
+          <a:xfrm>
+            <a:off x="743236" y="3710223"/>
+            <a:ext cx="6852050" cy="1323096"/>
+          </a:xfrm>
+        </p:spPr>
+        <p:txBody>
+          <a:bodyPr>
+            <a:normAutofit/>
+          </a:bodyPr>
+          <a:lstStyle/>
+          <a:p>
+            <a:r>
+              <a:rPr lang="fr-FR" sz="1600" dirty="0" smtClean="0"/>
+              <a:t>4 tâches où les deux paramètres de nos hypothèses varient</a:t>
+            </a:r>
+            <a:endParaRPr lang="fr-CH" sz="1600" dirty="0"/>
+          </a:p>
+        </p:txBody>
+      </p:sp>
+    </p:spTree>
+    <p:extLst>
+      <p:ext uri="{BB962C8B-B14F-4D97-AF65-F5344CB8AC3E}">
+        <p14:creationId xmlns:p14="http://schemas.microsoft.com/office/powerpoint/2010/main" val="930066963"/>
+      </p:ext>
+    </p:extLst>
+  </p:cSld>
+  <p:clrMapOvr>
+    <a:masterClrMapping/>
+  </p:clrMapOvr>
+  <p:timing>
+    <p:tnLst>
+      <p:par>
+        <p:cTn id="1" dur="indefinite" restart="never" nodeType="tmRoot"/>
+      </p:par>
+    </p:tnLst>
+  </p:timing>
 </p:sld>
 </file>
 

</xml_diff>

<commit_message>
Updated pres final 1 last two slides and put conclusion after work assignment
</commit_message>
<xml_diff>
--- a/Documents/Presentation_final_1.pptx
+++ b/Documents/Presentation_final_1.pptx
@@ -6,7 +6,7 @@
     <p:sldMasterId id="2147483711" r:id="rId2"/>
   </p:sldMasterIdLst>
   <p:notesMasterIdLst>
-    <p:notesMasterId r:id="rId17"/>
+    <p:notesMasterId r:id="rId18"/>
   </p:notesMasterIdLst>
   <p:sldIdLst>
     <p:sldId id="256" r:id="rId3"/>
@@ -20,9 +20,10 @@
     <p:sldId id="295" r:id="rId11"/>
     <p:sldId id="296" r:id="rId12"/>
     <p:sldId id="297" r:id="rId13"/>
-    <p:sldId id="298" r:id="rId14"/>
-    <p:sldId id="299" r:id="rId15"/>
-    <p:sldId id="287" r:id="rId16"/>
+    <p:sldId id="301" r:id="rId14"/>
+    <p:sldId id="300" r:id="rId15"/>
+    <p:sldId id="299" r:id="rId16"/>
+    <p:sldId id="287" r:id="rId17"/>
   </p:sldIdLst>
   <p:sldSz cx="12192000" cy="6858000"/>
   <p:notesSz cx="6858000" cy="9144000"/>
@@ -211,7 +212,7 @@
           <a:p>
             <a:fld id="{EBACBB57-5019-4C34-B895-9DAC8A1F72A5}" type="datetimeFigureOut">
               <a:rPr lang="fr-CH" smtClean="0"/>
-              <a:t>03.06.2020</a:t>
+              <a:t>05.06.2020</a:t>
             </a:fld>
             <a:endParaRPr lang="fr-CH"/>
           </a:p>
@@ -628,7 +629,7 @@
           <a:p>
             <a:fld id="{5D8B9E25-742F-4AB9-9769-63653C51E899}" type="slidenum">
               <a:rPr lang="fr-CH" smtClean="0"/>
-              <a:t>13</a:t>
+              <a:t>14</a:t>
             </a:fld>
             <a:endParaRPr lang="fr-CH"/>
           </a:p>
@@ -897,7 +898,7 @@
           <a:p>
             <a:fld id="{A1C5EC13-83CD-46FC-A749-A66713452AB8}" type="datetime1">
               <a:rPr lang="fr-CH" smtClean="0"/>
-              <a:t>03.06.2020</a:t>
+              <a:t>05.06.2020</a:t>
             </a:fld>
             <a:endParaRPr lang="fr-CH"/>
           </a:p>
@@ -1077,7 +1078,7 @@
           <a:p>
             <a:fld id="{7E456747-9D74-4D5C-A57B-216C1DCF555B}" type="datetime1">
               <a:rPr lang="fr-CH" smtClean="0"/>
-              <a:t>03.06.2020</a:t>
+              <a:t>05.06.2020</a:t>
             </a:fld>
             <a:endParaRPr lang="fr-CH"/>
           </a:p>
@@ -1257,7 +1258,7 @@
           <a:p>
             <a:fld id="{35AB7460-04F9-4582-9AE7-9E23C393B231}" type="datetime1">
               <a:rPr lang="fr-CH" smtClean="0"/>
-              <a:t>03.06.2020</a:t>
+              <a:t>05.06.2020</a:t>
             </a:fld>
             <a:endParaRPr lang="fr-CH"/>
           </a:p>
@@ -1442,7 +1443,7 @@
           <a:p>
             <a:fld id="{443BA57E-7B21-4F6F-82E1-FF01CD7ABA13}" type="datetime1">
               <a:rPr lang="fr-CH" smtClean="0"/>
-              <a:t>03.06.2020</a:t>
+              <a:t>05.06.2020</a:t>
             </a:fld>
             <a:endParaRPr lang="en-US" dirty="0"/>
           </a:p>
@@ -2253,7 +2254,7 @@
           <a:p>
             <a:fld id="{062309E3-34CC-4F3C-A1BD-713587317DF7}" type="datetime1">
               <a:rPr lang="fr-CH" smtClean="0"/>
-              <a:t>03.06.2020</a:t>
+              <a:t>05.06.2020</a:t>
             </a:fld>
             <a:endParaRPr lang="fr-CH"/>
           </a:p>
@@ -2428,7 +2429,7 @@
           <a:p>
             <a:fld id="{CA50544D-CD99-4DB3-9168-B3A8E20C09FE}" type="datetime1">
               <a:rPr lang="fr-CH" smtClean="0"/>
-              <a:t>03.06.2020</a:t>
+              <a:t>05.06.2020</a:t>
             </a:fld>
             <a:endParaRPr lang="fr-CH"/>
           </a:p>
@@ -2675,7 +2676,7 @@
           <a:p>
             <a:fld id="{0BA05AE5-1ED1-49B1-BD0C-362DD8300DA6}" type="datetime1">
               <a:rPr lang="fr-CH" smtClean="0"/>
-              <a:t>03.06.2020</a:t>
+              <a:t>05.06.2020</a:t>
             </a:fld>
             <a:endParaRPr lang="fr-CH"/>
           </a:p>
@@ -2907,7 +2908,7 @@
           <a:p>
             <a:fld id="{F321FB04-B1F8-410C-91A1-6F9F06ABF9AD}" type="datetime1">
               <a:rPr lang="fr-CH" smtClean="0"/>
-              <a:t>03.06.2020</a:t>
+              <a:t>05.06.2020</a:t>
             </a:fld>
             <a:endParaRPr lang="fr-CH"/>
           </a:p>
@@ -3281,7 +3282,7 @@
           <a:p>
             <a:fld id="{B78CB868-B46E-4481-9B17-F23B1E033C87}" type="datetime1">
               <a:rPr lang="fr-CH" smtClean="0"/>
-              <a:t>03.06.2020</a:t>
+              <a:t>05.06.2020</a:t>
             </a:fld>
             <a:endParaRPr lang="fr-CH"/>
           </a:p>
@@ -3404,7 +3405,7 @@
           <a:p>
             <a:fld id="{AED0E9EF-17A4-4D73-89B5-BE4B97634EE6}" type="datetime1">
               <a:rPr lang="fr-CH" smtClean="0"/>
-              <a:t>03.06.2020</a:t>
+              <a:t>05.06.2020</a:t>
             </a:fld>
             <a:endParaRPr lang="fr-CH"/>
           </a:p>
@@ -3499,7 +3500,7 @@
           <a:p>
             <a:fld id="{185805BF-25D7-407C-8F23-26F91DDF1D3E}" type="datetime1">
               <a:rPr lang="fr-CH" smtClean="0"/>
-              <a:t>03.06.2020</a:t>
+              <a:t>05.06.2020</a:t>
             </a:fld>
             <a:endParaRPr lang="fr-CH"/>
           </a:p>
@@ -3769,7 +3770,7 @@
           <a:p>
             <a:fld id="{159142C7-4527-4223-B0C3-EFB260406640}" type="datetime1">
               <a:rPr lang="fr-CH" smtClean="0"/>
-              <a:t>03.06.2020</a:t>
+              <a:t>05.06.2020</a:t>
             </a:fld>
             <a:endParaRPr lang="fr-CH"/>
           </a:p>
@@ -4034,7 +4035,7 @@
           <a:p>
             <a:fld id="{76BB6D0E-3881-4B3D-96CD-ECBF10879B6D}" type="datetime1">
               <a:rPr lang="fr-CH" smtClean="0"/>
-              <a:t>03.06.2020</a:t>
+              <a:t>05.06.2020</a:t>
             </a:fld>
             <a:endParaRPr lang="fr-CH"/>
           </a:p>
@@ -4339,7 +4340,7 @@
           <a:p>
             <a:fld id="{CE03783F-3525-484F-BB92-A97332512ECC}" type="datetime1">
               <a:rPr lang="fr-CH" smtClean="0"/>
-              <a:t>03.06.2020</a:t>
+              <a:t>05.06.2020</a:t>
             </a:fld>
             <a:endParaRPr lang="fr-CH"/>
           </a:p>
@@ -4548,7 +4549,7 @@
           <a:p>
             <a:fld id="{3DD17AEC-70AF-45C1-A4D8-B9682E9F5690}" type="datetime1">
               <a:rPr lang="fr-CH" smtClean="0"/>
-              <a:t>03.06.2020</a:t>
+              <a:t>05.06.2020</a:t>
             </a:fld>
             <a:endParaRPr lang="fr-CH"/>
           </a:p>
@@ -4862,7 +4863,7 @@
           <a:p>
             <a:fld id="{DD598F42-9E37-44B5-9404-FFDB7BFA3C58}" type="datetime1">
               <a:rPr lang="fr-CH" smtClean="0"/>
-              <a:t>03.06.2020</a:t>
+              <a:t>05.06.2020</a:t>
             </a:fld>
             <a:endParaRPr lang="fr-CH"/>
           </a:p>
@@ -5195,7 +5196,7 @@
           <a:p>
             <a:fld id="{D80A43B4-503F-48B3-9D69-A1E033EB31DC}" type="datetime1">
               <a:rPr lang="fr-CH" smtClean="0"/>
-              <a:t>03.06.2020</a:t>
+              <a:t>05.06.2020</a:t>
             </a:fld>
             <a:endParaRPr lang="fr-CH"/>
           </a:p>
@@ -5509,7 +5510,7 @@
           <a:p>
             <a:fld id="{C63570D4-DC05-4346-960C-EE641E3F13E6}" type="datetime1">
               <a:rPr lang="fr-CH" smtClean="0"/>
-              <a:t>03.06.2020</a:t>
+              <a:t>05.06.2020</a:t>
             </a:fld>
             <a:endParaRPr lang="fr-CH"/>
           </a:p>
@@ -5902,7 +5903,7 @@
           <a:p>
             <a:fld id="{6DAD8BB9-B4F7-4387-B4ED-AABAD1F880A7}" type="datetime1">
               <a:rPr lang="fr-CH" smtClean="0"/>
-              <a:t>03.06.2020</a:t>
+              <a:t>05.06.2020</a:t>
             </a:fld>
             <a:endParaRPr lang="fr-CH"/>
           </a:p>
@@ -6072,7 +6073,7 @@
           <a:p>
             <a:fld id="{5AECCC42-73C7-497A-91BC-5B46DEBB8AEF}" type="datetime1">
               <a:rPr lang="fr-CH" smtClean="0"/>
-              <a:t>03.06.2020</a:t>
+              <a:t>05.06.2020</a:t>
             </a:fld>
             <a:endParaRPr lang="fr-CH"/>
           </a:p>
@@ -6252,7 +6253,7 @@
           <a:p>
             <a:fld id="{24A8B8C1-AC7C-4439-ABE1-977A3F495DB0}" type="datetime1">
               <a:rPr lang="fr-CH" smtClean="0"/>
-              <a:t>03.06.2020</a:t>
+              <a:t>05.06.2020</a:t>
             </a:fld>
             <a:endParaRPr lang="fr-CH"/>
           </a:p>
@@ -6498,7 +6499,7 @@
           <a:p>
             <a:fld id="{8A489873-EBA8-4E74-A188-36791492334D}" type="datetime1">
               <a:rPr lang="fr-CH" smtClean="0"/>
-              <a:t>03.06.2020</a:t>
+              <a:t>05.06.2020</a:t>
             </a:fld>
             <a:endParaRPr lang="fr-CH"/>
           </a:p>
@@ -6730,7 +6731,7 @@
           <a:p>
             <a:fld id="{2716B30A-CC25-498D-A978-F9C8FA3447EC}" type="datetime1">
               <a:rPr lang="fr-CH" smtClean="0"/>
-              <a:t>03.06.2020</a:t>
+              <a:t>05.06.2020</a:t>
             </a:fld>
             <a:endParaRPr lang="fr-CH"/>
           </a:p>
@@ -7097,7 +7098,7 @@
           <a:p>
             <a:fld id="{86F0612F-4B27-4C50-9FEF-D899F02BE98F}" type="datetime1">
               <a:rPr lang="fr-CH" smtClean="0"/>
-              <a:t>03.06.2020</a:t>
+              <a:t>05.06.2020</a:t>
             </a:fld>
             <a:endParaRPr lang="fr-CH"/>
           </a:p>
@@ -7215,7 +7216,7 @@
           <a:p>
             <a:fld id="{1F3DD3EA-FE5E-4B40-AAF2-7BDC6B236448}" type="datetime1">
               <a:rPr lang="fr-CH" smtClean="0"/>
-              <a:t>03.06.2020</a:t>
+              <a:t>05.06.2020</a:t>
             </a:fld>
             <a:endParaRPr lang="fr-CH"/>
           </a:p>
@@ -7310,7 +7311,7 @@
           <a:p>
             <a:fld id="{DFCE601C-520E-4D95-87EA-C15A6C947E77}" type="datetime1">
               <a:rPr lang="fr-CH" smtClean="0"/>
-              <a:t>03.06.2020</a:t>
+              <a:t>05.06.2020</a:t>
             </a:fld>
             <a:endParaRPr lang="fr-CH"/>
           </a:p>
@@ -7587,7 +7588,7 @@
           <a:p>
             <a:fld id="{7CDD90FB-8902-44F1-AFF3-670F9F6ABDF8}" type="datetime1">
               <a:rPr lang="fr-CH" smtClean="0"/>
-              <a:t>03.06.2020</a:t>
+              <a:t>05.06.2020</a:t>
             </a:fld>
             <a:endParaRPr lang="fr-CH"/>
           </a:p>
@@ -7840,7 +7841,7 @@
           <a:p>
             <a:fld id="{6A97B839-6A40-4321-AA7D-D18AFAC76C0E}" type="datetime1">
               <a:rPr lang="fr-CH" smtClean="0"/>
-              <a:t>03.06.2020</a:t>
+              <a:t>05.06.2020</a:t>
             </a:fld>
             <a:endParaRPr lang="fr-CH"/>
           </a:p>
@@ -8053,7 +8054,7 @@
           <a:p>
             <a:fld id="{36C5D13F-9125-4315-B7A7-EB82236C947E}" type="datetime1">
               <a:rPr lang="fr-CH" smtClean="0"/>
-              <a:t>03.06.2020</a:t>
+              <a:t>05.06.2020</a:t>
             </a:fld>
             <a:endParaRPr lang="fr-CH"/>
           </a:p>
@@ -9127,7 +9128,7 @@
           <a:p>
             <a:fld id="{35BA6938-53D0-4653-82AB-3885BCA89A92}" type="datetime1">
               <a:rPr lang="fr-CH" smtClean="0"/>
-              <a:t>03.06.2020</a:t>
+              <a:t>05.06.2020</a:t>
             </a:fld>
             <a:endParaRPr lang="fr-CH"/>
           </a:p>
@@ -10036,11 +10037,11 @@
   <p:clrMapOvr>
     <a:masterClrMapping/>
   </p:clrMapOvr>
-  <mc:AlternateContent xmlns:mc="http://schemas.openxmlformats.org/markup-compatibility/2006">
-    <mc:Choice xmlns:p14="http://schemas.microsoft.com/office/powerpoint/2010/main" Requires="p14">
+  <mc:AlternateContent xmlns:mc="http://schemas.openxmlformats.org/markup-compatibility/2006" xmlns:p14="http://schemas.microsoft.com/office/powerpoint/2010/main">
+    <mc:Choice Requires="p14">
       <p:transition spd="slow" p14:dur="2000"/>
     </mc:Choice>
-    <mc:Fallback>
+    <mc:Fallback xmlns="">
       <p:transition spd="slow"/>
     </mc:Fallback>
   </mc:AlternateContent>
@@ -10078,7 +10079,7 @@
             <a:spLocks noGrp="1"/>
           </p:cNvSpPr>
           <p:nvPr>
-            <p:ph type="title"/>
+            <p:ph type="ctrTitle"/>
           </p:nvPr>
         </p:nvSpPr>
         <p:spPr/>
@@ -10087,21 +10088,20 @@
           <a:lstStyle/>
           <a:p>
             <a:r>
-              <a:rPr lang="fr-CH" dirty="0" smtClean="0"/>
-              <a:t>Conclusion</a:t>
-            </a:r>
-            <a:endParaRPr lang="fr-CH" dirty="0"/>
-          </a:p>
-        </p:txBody>
-      </p:sp>
-      <p:sp>
-        <p:nvSpPr>
-          <p:cNvPr id="3" name="Espace réservé du contenu 2"/>
-          <p:cNvSpPr>
-            <a:spLocks noGrp="1"/>
-          </p:cNvSpPr>
-          <p:nvPr>
-            <p:ph idx="1"/>
+              <a:rPr lang="fr-CH" dirty="0"/>
+              <a:t>Répartition des tâches</a:t>
+            </a:r>
+          </a:p>
+        </p:txBody>
+      </p:sp>
+      <p:sp>
+        <p:nvSpPr>
+          <p:cNvPr id="3" name="Sous-titre 2"/>
+          <p:cNvSpPr>
+            <a:spLocks noGrp="1"/>
+          </p:cNvSpPr>
+          <p:nvPr>
+            <p:ph type="subTitle" idx="1"/>
           </p:nvPr>
         </p:nvSpPr>
         <p:spPr/>
@@ -10109,7 +10109,7 @@
           <a:bodyPr/>
           <a:lstStyle/>
           <a:p>
-            <a:endParaRPr lang="fr-CH" dirty="0"/>
+            <a:endParaRPr lang="fr-CH"/>
           </a:p>
         </p:txBody>
       </p:sp>
@@ -10139,7 +10139,7 @@
     </p:spTree>
     <p:extLst>
       <p:ext uri="{BB962C8B-B14F-4D97-AF65-F5344CB8AC3E}">
-        <p14:creationId xmlns:p14="http://schemas.microsoft.com/office/powerpoint/2010/main" val="1940971933"/>
+        <p14:creationId xmlns:p14="http://schemas.microsoft.com/office/powerpoint/2010/main" val="923557339"/>
       </p:ext>
     </p:extLst>
   </p:cSld>
@@ -10180,6 +10180,107 @@
             <a:spLocks noGrp="1"/>
           </p:cNvSpPr>
           <p:nvPr>
+            <p:ph type="ctrTitle"/>
+          </p:nvPr>
+        </p:nvSpPr>
+        <p:spPr/>
+        <p:txBody>
+          <a:bodyPr/>
+          <a:lstStyle/>
+          <a:p>
+            <a:r>
+              <a:rPr lang="fr-CH" dirty="0"/>
+              <a:t>Conclusion</a:t>
+            </a:r>
+          </a:p>
+        </p:txBody>
+      </p:sp>
+      <p:sp>
+        <p:nvSpPr>
+          <p:cNvPr id="3" name="Sous-titre 2"/>
+          <p:cNvSpPr>
+            <a:spLocks noGrp="1"/>
+          </p:cNvSpPr>
+          <p:nvPr>
+            <p:ph type="subTitle" idx="1"/>
+          </p:nvPr>
+        </p:nvSpPr>
+        <p:spPr/>
+        <p:txBody>
+          <a:bodyPr/>
+          <a:lstStyle/>
+          <a:p>
+            <a:endParaRPr lang="fr-CH"/>
+          </a:p>
+        </p:txBody>
+      </p:sp>
+      <p:sp>
+        <p:nvSpPr>
+          <p:cNvPr id="4" name="Espace réservé du numéro de diapositive 3"/>
+          <p:cNvSpPr>
+            <a:spLocks noGrp="1"/>
+          </p:cNvSpPr>
+          <p:nvPr>
+            <p:ph type="sldNum" sz="quarter" idx="12"/>
+          </p:nvPr>
+        </p:nvSpPr>
+        <p:spPr/>
+        <p:txBody>
+          <a:bodyPr/>
+          <a:lstStyle/>
+          <a:p>
+            <a:fld id="{F60449C3-8BCD-4455-8E2A-A866209B9601}" type="slidenum">
+              <a:rPr lang="fr-CH" smtClean="0"/>
+              <a:t>13</a:t>
+            </a:fld>
+            <a:endParaRPr lang="fr-CH"/>
+          </a:p>
+        </p:txBody>
+      </p:sp>
+    </p:spTree>
+    <p:extLst>
+      <p:ext uri="{BB962C8B-B14F-4D97-AF65-F5344CB8AC3E}">
+        <p14:creationId xmlns:p14="http://schemas.microsoft.com/office/powerpoint/2010/main" val="1588935720"/>
+      </p:ext>
+    </p:extLst>
+  </p:cSld>
+  <p:clrMapOvr>
+    <a:masterClrMapping/>
+  </p:clrMapOvr>
+  <p:timing>
+    <p:tnLst>
+      <p:par>
+        <p:cTn id="1" dur="indefinite" restart="never" nodeType="tmRoot"/>
+      </p:par>
+    </p:tnLst>
+  </p:timing>
+</p:sld>
+</file>
+
+<file path=ppt/slides/slide14.xml><?xml version="1.0" encoding="utf-8"?>
+<p:sld xmlns:a="http://schemas.openxmlformats.org/drawingml/2006/main" xmlns:r="http://schemas.openxmlformats.org/officeDocument/2006/relationships" xmlns:p="http://schemas.openxmlformats.org/presentationml/2006/main" show="0">
+  <p:cSld>
+    <p:spTree>
+      <p:nvGrpSpPr>
+        <p:cNvPr id="1" name=""/>
+        <p:cNvGrpSpPr/>
+        <p:nvPr/>
+      </p:nvGrpSpPr>
+      <p:grpSpPr>
+        <a:xfrm>
+          <a:off x="0" y="0"/>
+          <a:ext cx="0" cy="0"/>
+          <a:chOff x="0" y="0"/>
+          <a:chExt cx="0" cy="0"/>
+        </a:xfrm>
+      </p:grpSpPr>
+      <p:sp>
+        <p:nvSpPr>
+          <p:cNvPr id="2" name="Titre 1"/>
+          <p:cNvSpPr>
+            <a:spLocks noGrp="1"/>
+          </p:cNvSpPr>
+          <p:nvPr>
             <p:ph type="title"/>
           </p:nvPr>
         </p:nvSpPr>
@@ -10241,7 +10342,7 @@
           <a:p>
             <a:fld id="{F60449C3-8BCD-4455-8E2A-A866209B9601}" type="slidenum">
               <a:rPr lang="fr-CH" smtClean="0"/>
-              <a:t>13</a:t>
+              <a:t>14</a:t>
             </a:fld>
             <a:endParaRPr lang="fr-CH"/>
           </a:p>
@@ -10287,6 +10388,14 @@
   <p:clrMapOvr>
     <a:masterClrMapping/>
   </p:clrMapOvr>
+  <mc:AlternateContent xmlns:mc="http://schemas.openxmlformats.org/markup-compatibility/2006">
+    <mc:Choice xmlns:p14="http://schemas.microsoft.com/office/powerpoint/2010/main" Requires="p14">
+      <p:transition spd="slow" p14:dur="2000"/>
+    </mc:Choice>
+    <mc:Fallback>
+      <p:transition spd="slow"/>
+    </mc:Fallback>
+  </mc:AlternateContent>
   <p:timing>
     <p:tnLst>
       <p:par>
@@ -10297,7 +10406,7 @@
 </p:sld>
 </file>
 
-<file path=ppt/slides/slide14.xml><?xml version="1.0" encoding="utf-8"?>
+<file path=ppt/slides/slide15.xml><?xml version="1.0" encoding="utf-8"?>
 <p:sld xmlns:a="http://schemas.openxmlformats.org/drawingml/2006/main" xmlns:r="http://schemas.openxmlformats.org/officeDocument/2006/relationships" xmlns:p="http://schemas.openxmlformats.org/presentationml/2006/main">
   <p:cSld>
     <p:spTree>
@@ -10372,7 +10481,7 @@
           <a:p>
             <a:fld id="{5C659214-C5B2-4878-BE63-6680446A108B}" type="slidenum">
               <a:rPr lang="fr-CH" smtClean="0"/>
-              <a:t>14</a:t>
+              <a:t>15</a:t>
             </a:fld>
             <a:endParaRPr lang="fr-CH"/>
           </a:p>
@@ -11709,7 +11818,6 @@
               <a:rPr lang="fr-CH" sz="2800" dirty="0"/>
               <a:t>Phase d’introduction</a:t>
             </a:r>
-            <a:endParaRPr lang="fr-CH" sz="2800" dirty="0"/>
           </a:p>
         </p:txBody>
       </p:sp>

</xml_diff>

<commit_message>
Fixed pattern generation for fianl presentation 1
</commit_message>
<xml_diff>
--- a/Documents/Presentation_final_1.pptx
+++ b/Documents/Presentation_final_1.pptx
@@ -10388,11 +10388,11 @@
   <p:clrMapOvr>
     <a:masterClrMapping/>
   </p:clrMapOvr>
-  <mc:AlternateContent xmlns:mc="http://schemas.openxmlformats.org/markup-compatibility/2006">
-    <mc:Choice xmlns:p14="http://schemas.microsoft.com/office/powerpoint/2010/main" Requires="p14">
+  <mc:AlternateContent xmlns:mc="http://schemas.openxmlformats.org/markup-compatibility/2006" xmlns:p14="http://schemas.microsoft.com/office/powerpoint/2010/main">
+    <mc:Choice Requires="p14">
       <p:transition spd="slow" p14:dur="2000"/>
     </mc:Choice>
-    <mc:Fallback>
+    <mc:Fallback xmlns="">
       <p:transition spd="slow"/>
     </mc:Fallback>
   </mc:AlternateContent>

</xml_diff>